<commit_message>
Updated video for music example.
</commit_message>
<xml_diff>
--- a/exercises/cisc-813/temporal/slides.pptx
+++ b/exercises/cisc-813/temporal/slides.pptx
@@ -695,7 +695,7 @@
           <a:p>
             <a:fld id="{D6D0F569-AC90-44EB-9EF4-4E5C2F5D823C}" type="datetime1">
               <a:rPr lang="en-US" smtClean="0"/>
-              <a:t>2/22/2023</a:t>
+              <a:t>2/23/2023</a:t>
             </a:fld>
             <a:endParaRPr lang="en-US" dirty="0"/>
           </a:p>
@@ -1374,7 +1374,7 @@
           <a:p>
             <a:fld id="{46BA7D41-E8B7-4A0B-B861-3EC4AE88917D}" type="datetime1">
               <a:rPr lang="en-US" smtClean="0"/>
-              <a:t>2/22/2023</a:t>
+              <a:t>2/23/2023</a:t>
             </a:fld>
             <a:endParaRPr lang="en-US" dirty="0"/>
           </a:p>
@@ -2063,7 +2063,7 @@
           <a:p>
             <a:fld id="{A7C34823-0B19-4B4E-A643-7A3B0A3D24D6}" type="datetime1">
               <a:rPr lang="en-US" smtClean="0"/>
-              <a:t>2/22/2023</a:t>
+              <a:t>2/23/2023</a:t>
             </a:fld>
             <a:endParaRPr lang="en-US" dirty="0"/>
           </a:p>
@@ -3186,7 +3186,7 @@
           <a:p>
             <a:fld id="{8C2D79EF-17C8-45D8-9866-DAF5723FC604}" type="datetime1">
               <a:rPr lang="en-US" smtClean="0"/>
-              <a:t>2/22/2023</a:t>
+              <a:t>2/23/2023</a:t>
             </a:fld>
             <a:endParaRPr lang="en-US" dirty="0"/>
           </a:p>
@@ -3941,7 +3941,7 @@
           <a:p>
             <a:fld id="{DFFC2ADC-3680-4013-A757-E4663495DB98}" type="datetime1">
               <a:rPr lang="en-US" smtClean="0"/>
-              <a:t>2/22/2023</a:t>
+              <a:t>2/23/2023</a:t>
             </a:fld>
             <a:endParaRPr lang="en-US" dirty="0"/>
           </a:p>
@@ -4688,7 +4688,7 @@
           <a:p>
             <a:fld id="{4751BA94-5DCA-4F19-960F-0FB2BD5EE85A}" type="datetime1">
               <a:rPr lang="en-US" smtClean="0"/>
-              <a:t>2/22/2023</a:t>
+              <a:t>2/23/2023</a:t>
             </a:fld>
             <a:endParaRPr lang="en-US" dirty="0"/>
           </a:p>
@@ -5582,7 +5582,7 @@
           <a:p>
             <a:fld id="{01BED947-38D9-44AC-8B89-E79758333B77}" type="datetime1">
               <a:rPr lang="en-US" smtClean="0"/>
-              <a:t>2/22/2023</a:t>
+              <a:t>2/23/2023</a:t>
             </a:fld>
             <a:endParaRPr lang="en-US" dirty="0"/>
           </a:p>
@@ -6203,7 +6203,7 @@
           <a:p>
             <a:fld id="{3781E23F-BD3C-4F23-B116-2B758120C8AC}" type="datetime1">
               <a:rPr lang="en-US" smtClean="0"/>
-              <a:t>2/22/2023</a:t>
+              <a:t>2/23/2023</a:t>
             </a:fld>
             <a:endParaRPr lang="en-US" dirty="0"/>
           </a:p>
@@ -6795,7 +6795,7 @@
           <a:p>
             <a:fld id="{473CFAA9-6D59-4D98-869E-ACBDB83B2CA4}" type="datetime1">
               <a:rPr lang="en-US" smtClean="0"/>
-              <a:t>2/22/2023</a:t>
+              <a:t>2/23/2023</a:t>
             </a:fld>
             <a:endParaRPr lang="en-US"/>
           </a:p>
@@ -7587,7 +7587,7 @@
           <a:p>
             <a:fld id="{DC410804-27E3-430A-BB42-B831260DE39A}" type="datetime1">
               <a:rPr lang="en-US" smtClean="0"/>
-              <a:t>2/22/2023</a:t>
+              <a:t>2/23/2023</a:t>
             </a:fld>
             <a:endParaRPr lang="en-US" dirty="0"/>
           </a:p>
@@ -8358,7 +8358,7 @@
           <a:p>
             <a:fld id="{60E22DE3-3D1A-4D53-B9A6-6C7463B8C992}" type="datetime1">
               <a:rPr lang="en-US" smtClean="0"/>
-              <a:t>2/22/2023</a:t>
+              <a:t>2/23/2023</a:t>
             </a:fld>
             <a:endParaRPr lang="en-US" dirty="0"/>
           </a:p>
@@ -8669,7 +8669,7 @@
             <a:fld id="{5ECD8B30-1B71-45A1-8314-D59C86F581E1}" type="datetime1">
               <a:rPr lang="en-US" smtClean="0"/>
               <a:pPr/>
-              <a:t>2/22/2023</a:t>
+              <a:t>2/23/2023</a:t>
             </a:fld>
             <a:endParaRPr lang="en-US" b="1" dirty="0"/>
           </a:p>
@@ -10901,11 +10901,11 @@
       </p:grpSpPr>
       <p:pic>
         <p:nvPicPr>
-          <p:cNvPr id="4" name="Online Media 3" title="Axis of Awesome - 4 Four Chord Song (with song titles)">
+          <p:cNvPr id="2" name="Online Media 1" title="Axis of Awesome - All Popular Songs Are The Same 4 Chords">
             <a:hlinkClick r:id="" action="ppaction://media"/>
             <a:extLst>
               <a:ext uri="{FF2B5EF4-FFF2-40B4-BE49-F238E27FC236}">
-                <a16:creationId xmlns:a16="http://schemas.microsoft.com/office/drawing/2014/main" id="{A9029512-17C4-33EA-CB9D-EE694FC1EBA7}"/>
+                <a16:creationId xmlns:a16="http://schemas.microsoft.com/office/drawing/2014/main" id="{D05AE98C-4263-C74D-D6CF-7823EA0A5821}"/>
               </a:ext>
             </a:extLst>
           </p:cNvPr>
@@ -10972,7 +10972,7 @@
                                       <p:cBhvr>
                                         <p:cTn id="6" dur="1" fill="hold"/>
                                         <p:tgtEl>
-                                          <p:spTgt spid="4"/>
+                                          <p:spTgt spid="2"/>
                                         </p:tgtEl>
                                       </p:cBhvr>
                                     </p:cmd>
@@ -11010,7 +11010,7 @@
                   </p:stCondLst>
                 </p:cTn>
                 <p:tgtEl>
-                  <p:spTgt spid="4"/>
+                  <p:spTgt spid="2"/>
                 </p:tgtEl>
               </p:cMediaNode>
             </p:video>
@@ -11019,7 +11019,7 @@
                 <p:stCondLst>
                   <p:cond evt="onClick" delay="0">
                     <p:tgtEl>
-                      <p:spTgt spid="4"/>
+                      <p:spTgt spid="2"/>
                     </p:tgtEl>
                   </p:cond>
                 </p:stCondLst>
@@ -11049,7 +11049,7 @@
                                       <p:cBhvr>
                                         <p:cTn id="12" dur="1" fill="hold"/>
                                         <p:tgtEl>
-                                          <p:spTgt spid="4"/>
+                                          <p:spTgt spid="2"/>
                                         </p:tgtEl>
                                       </p:cBhvr>
                                     </p:cmd>
@@ -11067,7 +11067,7 @@
               <p:nextCondLst>
                 <p:cond evt="onClick" delay="0">
                   <p:tgtEl>
-                    <p:spTgt spid="4"/>
+                    <p:spTgt spid="2"/>
                   </p:tgtEl>
                 </p:cond>
               </p:nextCondLst>

</xml_diff>

<commit_message>
Finished the slide deck for the temporal exercise.
</commit_message>
<xml_diff>
--- a/exercises/cisc-813/temporal/slides.pptx
+++ b/exercises/cisc-813/temporal/slides.pptx
@@ -7,22 +7,25 @@
   <p:sldIdLst>
     <p:sldId id="1685" r:id="rId2"/>
     <p:sldId id="258" r:id="rId3"/>
-    <p:sldId id="1712" r:id="rId4"/>
-    <p:sldId id="1711" r:id="rId5"/>
-    <p:sldId id="257" r:id="rId6"/>
-    <p:sldId id="261" r:id="rId7"/>
-    <p:sldId id="1709" r:id="rId8"/>
-    <p:sldId id="1694" r:id="rId9"/>
-    <p:sldId id="1700" r:id="rId10"/>
-    <p:sldId id="1695" r:id="rId11"/>
-    <p:sldId id="1701" r:id="rId12"/>
-    <p:sldId id="1696" r:id="rId13"/>
-    <p:sldId id="1702" r:id="rId14"/>
-    <p:sldId id="1697" r:id="rId15"/>
-    <p:sldId id="1703" r:id="rId16"/>
-    <p:sldId id="1710" r:id="rId17"/>
-    <p:sldId id="1698" r:id="rId18"/>
-    <p:sldId id="1684" r:id="rId19"/>
+    <p:sldId id="1716" r:id="rId4"/>
+    <p:sldId id="1712" r:id="rId5"/>
+    <p:sldId id="1711" r:id="rId6"/>
+    <p:sldId id="257" r:id="rId7"/>
+    <p:sldId id="261" r:id="rId8"/>
+    <p:sldId id="1709" r:id="rId9"/>
+    <p:sldId id="1714" r:id="rId10"/>
+    <p:sldId id="1694" r:id="rId11"/>
+    <p:sldId id="1700" r:id="rId12"/>
+    <p:sldId id="1695" r:id="rId13"/>
+    <p:sldId id="1701" r:id="rId14"/>
+    <p:sldId id="1696" r:id="rId15"/>
+    <p:sldId id="1702" r:id="rId16"/>
+    <p:sldId id="1697" r:id="rId17"/>
+    <p:sldId id="1710" r:id="rId18"/>
+    <p:sldId id="1698" r:id="rId19"/>
+    <p:sldId id="1713" r:id="rId20"/>
+    <p:sldId id="1715" r:id="rId21"/>
+    <p:sldId id="1684" r:id="rId22"/>
   </p:sldIdLst>
   <p:sldSz cx="12192000" cy="6858000"/>
   <p:notesSz cx="6858000" cy="9144000"/>
@@ -695,7 +698,7 @@
           <a:p>
             <a:fld id="{D6D0F569-AC90-44EB-9EF4-4E5C2F5D823C}" type="datetime1">
               <a:rPr lang="en-US" smtClean="0"/>
-              <a:t>2/23/2023</a:t>
+              <a:t>2/25/2023</a:t>
             </a:fld>
             <a:endParaRPr lang="en-US" dirty="0"/>
           </a:p>
@@ -1374,7 +1377,7 @@
           <a:p>
             <a:fld id="{46BA7D41-E8B7-4A0B-B861-3EC4AE88917D}" type="datetime1">
               <a:rPr lang="en-US" smtClean="0"/>
-              <a:t>2/23/2023</a:t>
+              <a:t>2/25/2023</a:t>
             </a:fld>
             <a:endParaRPr lang="en-US" dirty="0"/>
           </a:p>
@@ -2063,7 +2066,7 @@
           <a:p>
             <a:fld id="{A7C34823-0B19-4B4E-A643-7A3B0A3D24D6}" type="datetime1">
               <a:rPr lang="en-US" smtClean="0"/>
-              <a:t>2/23/2023</a:t>
+              <a:t>2/25/2023</a:t>
             </a:fld>
             <a:endParaRPr lang="en-US" dirty="0"/>
           </a:p>
@@ -3186,7 +3189,7 @@
           <a:p>
             <a:fld id="{8C2D79EF-17C8-45D8-9866-DAF5723FC604}" type="datetime1">
               <a:rPr lang="en-US" smtClean="0"/>
-              <a:t>2/23/2023</a:t>
+              <a:t>2/25/2023</a:t>
             </a:fld>
             <a:endParaRPr lang="en-US" dirty="0"/>
           </a:p>
@@ -3941,7 +3944,7 @@
           <a:p>
             <a:fld id="{DFFC2ADC-3680-4013-A757-E4663495DB98}" type="datetime1">
               <a:rPr lang="en-US" smtClean="0"/>
-              <a:t>2/23/2023</a:t>
+              <a:t>2/25/2023</a:t>
             </a:fld>
             <a:endParaRPr lang="en-US" dirty="0"/>
           </a:p>
@@ -4688,7 +4691,7 @@
           <a:p>
             <a:fld id="{4751BA94-5DCA-4F19-960F-0FB2BD5EE85A}" type="datetime1">
               <a:rPr lang="en-US" smtClean="0"/>
-              <a:t>2/23/2023</a:t>
+              <a:t>2/25/2023</a:t>
             </a:fld>
             <a:endParaRPr lang="en-US" dirty="0"/>
           </a:p>
@@ -5582,7 +5585,7 @@
           <a:p>
             <a:fld id="{01BED947-38D9-44AC-8B89-E79758333B77}" type="datetime1">
               <a:rPr lang="en-US" smtClean="0"/>
-              <a:t>2/23/2023</a:t>
+              <a:t>2/25/2023</a:t>
             </a:fld>
             <a:endParaRPr lang="en-US" dirty="0"/>
           </a:p>
@@ -6203,7 +6206,7 @@
           <a:p>
             <a:fld id="{3781E23F-BD3C-4F23-B116-2B758120C8AC}" type="datetime1">
               <a:rPr lang="en-US" smtClean="0"/>
-              <a:t>2/23/2023</a:t>
+              <a:t>2/25/2023</a:t>
             </a:fld>
             <a:endParaRPr lang="en-US" dirty="0"/>
           </a:p>
@@ -6795,7 +6798,7 @@
           <a:p>
             <a:fld id="{473CFAA9-6D59-4D98-869E-ACBDB83B2CA4}" type="datetime1">
               <a:rPr lang="en-US" smtClean="0"/>
-              <a:t>2/23/2023</a:t>
+              <a:t>2/25/2023</a:t>
             </a:fld>
             <a:endParaRPr lang="en-US"/>
           </a:p>
@@ -7587,7 +7590,7 @@
           <a:p>
             <a:fld id="{DC410804-27E3-430A-BB42-B831260DE39A}" type="datetime1">
               <a:rPr lang="en-US" smtClean="0"/>
-              <a:t>2/23/2023</a:t>
+              <a:t>2/25/2023</a:t>
             </a:fld>
             <a:endParaRPr lang="en-US" dirty="0"/>
           </a:p>
@@ -8358,7 +8361,7 @@
           <a:p>
             <a:fld id="{60E22DE3-3D1A-4D53-B9A6-6C7463B8C992}" type="datetime1">
               <a:rPr lang="en-US" smtClean="0"/>
-              <a:t>2/23/2023</a:t>
+              <a:t>2/25/2023</a:t>
             </a:fld>
             <a:endParaRPr lang="en-US" dirty="0"/>
           </a:p>
@@ -8669,7 +8672,7 @@
             <a:fld id="{5ECD8B30-1B71-45A1-8314-D59C86F581E1}" type="datetime1">
               <a:rPr lang="en-US" smtClean="0"/>
               <a:pPr/>
-              <a:t>2/23/2023</a:t>
+              <a:t>2/25/2023</a:t>
             </a:fld>
             <a:endParaRPr lang="en-US" b="1" dirty="0"/>
           </a:p>
@@ -9210,13 +9213,8 @@
           <a:p>
             <a:r>
               <a:rPr lang="en-CA" dirty="0"/>
-              <a:t>2. Embodied </a:t>
-            </a:r>
-            <a:r>
-              <a:rPr lang="en-CA" dirty="0" err="1"/>
-              <a:t>Secredoku</a:t>
-            </a:r>
-            <a:endParaRPr lang="en-CA" dirty="0"/>
+              <a:t>1. Let’s make some music</a:t>
+            </a:r>
           </a:p>
         </p:txBody>
       </p:sp>
@@ -9236,17 +9234,68 @@
             <p:ph idx="1"/>
           </p:nvPr>
         </p:nvSpPr>
-        <p:spPr/>
+        <p:spPr>
+          <a:xfrm>
+            <a:off x="838200" y="1825625"/>
+            <a:ext cx="10515600" cy="4494152"/>
+          </a:xfrm>
+        </p:spPr>
         <p:txBody>
-          <a:bodyPr/>
+          <a:bodyPr>
+            <a:normAutofit/>
+          </a:bodyPr>
           <a:lstStyle/>
           <a:p>
             <a:pPr marL="0" indent="0">
               <a:buNone/>
             </a:pPr>
             <a:r>
+              <a:rPr lang="en-CA" sz="3200" dirty="0"/>
+              <a:t>No chords yet, let’s just bash out some notes, shall we?</a:t>
+            </a:r>
+          </a:p>
+          <a:p>
+            <a:pPr marL="0" indent="0">
+              <a:buNone/>
+            </a:pPr>
+            <a:endParaRPr lang="en-CA" sz="3200" dirty="0"/>
+          </a:p>
+          <a:p>
+            <a:r>
               <a:rPr lang="en-CA" dirty="0"/>
-              <a:t>Now we have an agent walking around. How fun!</a:t>
+              <a:t>Let’s take a look together at the </a:t>
+            </a:r>
+            <a:r>
+              <a:rPr lang="en-CA" dirty="0">
+                <a:solidFill>
+                  <a:schemeClr val="accent2"/>
+                </a:solidFill>
+              </a:rPr>
+              <a:t>predicates</a:t>
+            </a:r>
+            <a:r>
+              <a:rPr lang="en-CA" dirty="0"/>
+              <a:t>, </a:t>
+            </a:r>
+            <a:r>
+              <a:rPr lang="en-CA" dirty="0">
+                <a:solidFill>
+                  <a:schemeClr val="accent1"/>
+                </a:solidFill>
+              </a:rPr>
+              <a:t>functions</a:t>
+            </a:r>
+            <a:r>
+              <a:rPr lang="en-CA" dirty="0"/>
+              <a:t>, and </a:t>
+            </a:r>
+            <a:r>
+              <a:rPr lang="en-CA" dirty="0" err="1"/>
+              <a:t>init</a:t>
+            </a:r>
+            <a:r>
+              <a:rPr lang="en-CA" dirty="0"/>
+              <a:t>/goal</a:t>
             </a:r>
             <a:br>
               <a:rPr lang="en-CA" dirty="0"/>
@@ -9256,13 +9305,7 @@
           <a:p>
             <a:r>
               <a:rPr lang="en-CA" dirty="0"/>
-              <a:t>Again, look at the problem file (together, shall we?) to understand</a:t>
-            </a:r>
-          </a:p>
-          <a:p>
-            <a:r>
-              <a:rPr lang="en-CA" dirty="0"/>
-              <a:t>Only allow </a:t>
+              <a:t>Create the </a:t>
             </a:r>
             <a:r>
               <a:rPr lang="en-CA" b="1" dirty="0">
@@ -9270,67 +9313,33 @@
                   <a:schemeClr val="accent4"/>
                 </a:solidFill>
               </a:rPr>
-              <a:t>check</a:t>
+              <a:t>play-note</a:t>
             </a:r>
             <a:r>
               <a:rPr lang="en-CA" dirty="0"/>
-              <a:t> when the location is unsolved and agent is there</a:t>
-            </a:r>
-          </a:p>
-          <a:p>
-            <a:r>
+              <a:t> action to create monophonic melodies</a:t>
+            </a:r>
+            <a:br>
               <a:rPr lang="en-CA" dirty="0"/>
-              <a:t>Add a standard </a:t>
-            </a:r>
-            <a:r>
-              <a:rPr lang="en-CA" b="1" dirty="0">
-                <a:solidFill>
-                  <a:schemeClr val="accent4"/>
-                </a:solidFill>
-              </a:rPr>
-              <a:t>move</a:t>
-            </a:r>
-            <a:r>
+            </a:br>
+            <a:br>
               <a:rPr lang="en-CA" dirty="0"/>
-              <a:t> action (based on </a:t>
-            </a:r>
-            <a:r>
-              <a:rPr lang="en-CA" b="1" dirty="0">
-                <a:solidFill>
-                  <a:schemeClr val="accent2"/>
-                </a:solidFill>
-              </a:rPr>
-              <a:t>link</a:t>
-            </a:r>
-            <a:r>
+            </a:br>
+            <a:br>
               <a:rPr lang="en-CA" dirty="0"/>
-              <a:t> predicate)</a:t>
-            </a:r>
-          </a:p>
-          <a:p>
-            <a:endParaRPr lang="en-CA" dirty="0"/>
-          </a:p>
-          <a:p>
-            <a:pPr marL="0" indent="0" algn="ctr">
-              <a:buNone/>
-            </a:pPr>
-            <a:r>
-              <a:rPr lang="en-CA" sz="2800" dirty="0"/>
-              <a:t>http://editor.planning.domains/planning-course/ppos/mobile</a:t>
-            </a:r>
-          </a:p>
-          <a:p>
-            <a:pPr marL="0" indent="0">
-              <a:buNone/>
-            </a:pPr>
-            <a:endParaRPr lang="en-CA" dirty="0"/>
+            </a:br>
+            <a:r>
+              <a:rPr lang="en-CA" dirty="0"/>
+              <a:t>      http://editor.planning.domains/planning-course/temporal/abc</a:t>
+            </a:r>
+            <a:endParaRPr lang="en-CA" sz="2800" dirty="0"/>
           </a:p>
         </p:txBody>
       </p:sp>
     </p:spTree>
     <p:extLst>
       <p:ext uri="{BB962C8B-B14F-4D97-AF65-F5344CB8AC3E}">
-        <p14:creationId xmlns:p14="http://schemas.microsoft.com/office/powerpoint/2010/main" val="1445019752"/>
+        <p14:creationId xmlns:p14="http://schemas.microsoft.com/office/powerpoint/2010/main" val="1315833981"/>
       </p:ext>
     </p:extLst>
   </p:cSld>
@@ -9373,7 +9382,12 @@
             <p:ph idx="1"/>
           </p:nvPr>
         </p:nvSpPr>
-        <p:spPr/>
+        <p:spPr>
+          <a:xfrm>
+            <a:off x="838200" y="1825625"/>
+            <a:ext cx="10515600" cy="3371408"/>
+          </a:xfrm>
+        </p:spPr>
         <p:txBody>
           <a:bodyPr/>
           <a:lstStyle/>
@@ -9395,7 +9409,7 @@
             </a:pPr>
             <a:r>
               <a:rPr lang="en-CA" sz="2800" dirty="0"/>
-              <a:t>http://editor.planning.domains/planning-course/ppos/moveit</a:t>
+              <a:t>http://editor.planning.domains/planning-course/temporal/oolala</a:t>
             </a:r>
           </a:p>
         </p:txBody>
@@ -9403,7 +9417,7 @@
     </p:spTree>
     <p:extLst>
       <p:ext uri="{BB962C8B-B14F-4D97-AF65-F5344CB8AC3E}">
-        <p14:creationId xmlns:p14="http://schemas.microsoft.com/office/powerpoint/2010/main" val="3108447499"/>
+        <p14:creationId xmlns:p14="http://schemas.microsoft.com/office/powerpoint/2010/main" val="4031490244"/>
       </p:ext>
     </p:extLst>
   </p:cSld>
@@ -9465,13 +9479,8 @@
           <a:p>
             <a:r>
               <a:rPr lang="en-CA" dirty="0"/>
-              <a:t>3. </a:t>
-            </a:r>
-            <a:r>
-              <a:rPr lang="en-US" dirty="0"/>
-              <a:t>Limited Sensing</a:t>
-            </a:r>
-            <a:endParaRPr lang="en-CA" dirty="0"/>
+              <a:t>2. Chords</a:t>
+            </a:r>
           </a:p>
         </p:txBody>
       </p:sp>
@@ -9493,9 +9502,7 @@
         </p:nvSpPr>
         <p:spPr/>
         <p:txBody>
-          <a:bodyPr>
-            <a:normAutofit/>
-          </a:bodyPr>
+          <a:bodyPr/>
           <a:lstStyle/>
           <a:p>
             <a:pPr marL="0" indent="0">
@@ -9503,7 +9510,7 @@
             </a:pPr>
             <a:r>
               <a:rPr lang="en-CA" dirty="0"/>
-              <a:t>Nothing in life is truly free…let’s force the agent to pay!</a:t>
+              <a:t>Let’s put some structure in here…</a:t>
             </a:r>
             <a:br>
               <a:rPr lang="en-CA" dirty="0"/>
@@ -9513,7 +9520,17 @@
           <a:p>
             <a:r>
               <a:rPr lang="en-CA" dirty="0"/>
-              <a:t>Add a </a:t>
+              <a:t>Again, look at the problem file (together, shall we?) to understand</a:t>
+            </a:r>
+            <a:br>
+              <a:rPr lang="en-CA" dirty="0"/>
+            </a:br>
+            <a:endParaRPr lang="en-CA" dirty="0"/>
+          </a:p>
+          <a:p>
+            <a:r>
+              <a:rPr lang="en-CA" dirty="0"/>
+              <a:t>Only allow </a:t>
             </a:r>
             <a:r>
               <a:rPr lang="en-CA" b="1" dirty="0">
@@ -9521,30 +9538,21 @@
                   <a:schemeClr val="accent4"/>
                 </a:solidFill>
               </a:rPr>
-              <a:t>teleport</a:t>
+              <a:t>play-note</a:t>
             </a:r>
             <a:r>
               <a:rPr lang="en-CA" dirty="0"/>
-              <a:t> action that lets them move instantly anywhere</a:t>
-            </a:r>
-          </a:p>
-          <a:p>
-            <a:pPr lvl="1"/>
-            <a:r>
+              <a:t> when an appropriate chord is playing</a:t>
+            </a:r>
+            <a:br>
               <a:rPr lang="en-CA" dirty="0"/>
-              <a:t>Use the </a:t>
-            </a:r>
-            <a:r>
-              <a:rPr lang="en-CA" b="1" dirty="0">
-                <a:solidFill>
-                  <a:schemeClr val="accent2"/>
-                </a:solidFill>
-              </a:rPr>
-              <a:t>teleport-count </a:t>
-            </a:r>
+            </a:br>
+            <a:endParaRPr lang="en-CA" dirty="0"/>
+          </a:p>
+          <a:p>
             <a:r>
               <a:rPr lang="en-CA" dirty="0"/>
-              <a:t>fluent to count the number of </a:t>
+              <a:t>Add a new </a:t>
             </a:r>
             <a:r>
               <a:rPr lang="en-CA" b="1" dirty="0">
@@ -9552,18 +9560,11 @@
                   <a:schemeClr val="accent4"/>
                 </a:solidFill>
               </a:rPr>
-              <a:t>teleport</a:t>
+              <a:t>play-chord</a:t>
             </a:r>
             <a:r>
               <a:rPr lang="en-CA" dirty="0"/>
-              <a:t> actions</a:t>
-            </a:r>
-          </a:p>
-          <a:p>
-            <a:pPr lvl="1"/>
-            <a:r>
-              <a:rPr lang="en-CA" dirty="0"/>
-              <a:t>Restrict teleporting to not having a count of 1 (that’s all you get!)</a:t>
+              <a:t> action given the 4 chords we now know</a:t>
             </a:r>
             <a:br>
               <a:rPr lang="en-CA" dirty="0"/>
@@ -9571,49 +9572,18 @@
             <a:endParaRPr lang="en-CA" dirty="0"/>
           </a:p>
           <a:p>
-            <a:r>
-              <a:rPr lang="en-CA" dirty="0"/>
-              <a:t>Similarly, create </a:t>
-            </a:r>
-            <a:r>
-              <a:rPr lang="en-CA" b="1" dirty="0">
-                <a:solidFill>
-                  <a:schemeClr val="accent4"/>
-                </a:solidFill>
-              </a:rPr>
-              <a:t>setup-check</a:t>
-            </a:r>
-            <a:r>
-              <a:rPr lang="en-CA" dirty="0"/>
-              <a:t> to keep track of </a:t>
-            </a:r>
-            <a:r>
-              <a:rPr lang="en-CA" b="1" dirty="0">
-                <a:solidFill>
-                  <a:schemeClr val="accent4"/>
-                </a:solidFill>
-              </a:rPr>
-              <a:t>check</a:t>
-            </a:r>
-            <a:r>
-              <a:rPr lang="en-CA" dirty="0"/>
-              <a:t> actions</a:t>
+            <a:pPr marL="0" indent="0" algn="ctr">
+              <a:buNone/>
+            </a:pPr>
+            <a:r>
+              <a:rPr lang="en-CA" sz="2800" dirty="0"/>
+              <a:t>http://editor.planning.domains/planning-course/temporal/chords</a:t>
             </a:r>
           </a:p>
           <a:p>
             <a:pPr marL="0" indent="0">
               <a:buNone/>
             </a:pPr>
-            <a:endParaRPr lang="en-CA" dirty="0"/>
-          </a:p>
-          <a:p>
-            <a:pPr marL="0" indent="0" algn="ctr">
-              <a:buNone/>
-            </a:pPr>
-            <a:r>
-              <a:rPr lang="en-CA" sz="2800" dirty="0"/>
-              <a:t>http://editor.planning.domains/planning-course/ppos/payup</a:t>
-            </a:r>
             <a:endParaRPr lang="en-CA" dirty="0"/>
           </a:p>
         </p:txBody>
@@ -9621,7 +9591,7 @@
     </p:spTree>
     <p:extLst>
       <p:ext uri="{BB962C8B-B14F-4D97-AF65-F5344CB8AC3E}">
-        <p14:creationId xmlns:p14="http://schemas.microsoft.com/office/powerpoint/2010/main" val="2049898440"/>
+        <p14:creationId xmlns:p14="http://schemas.microsoft.com/office/powerpoint/2010/main" val="1445019752"/>
       </p:ext>
     </p:extLst>
   </p:cSld>
@@ -9686,15 +9656,27 @@
             </a:pPr>
             <a:r>
               <a:rPr lang="en-CA" sz="2800" dirty="0"/>
-              <a:t>http://editor.planning.domains/planning-course/ppos/momoney</a:t>
-            </a:r>
+              <a:t>http://editor.planning.domains/planning-course/</a:t>
+            </a:r>
+            <a:br>
+              <a:rPr lang="en-CA" sz="2800" dirty="0"/>
+            </a:br>
+            <a:r>
+              <a:rPr lang="en-CA" sz="2800" dirty="0"/>
+              <a:t>temporal/</a:t>
+            </a:r>
+            <a:r>
+              <a:rPr lang="en-CA" sz="2800" dirty="0" err="1"/>
+              <a:t>wheresmyukulele</a:t>
+            </a:r>
+            <a:endParaRPr lang="en-CA" sz="2800" dirty="0"/>
           </a:p>
         </p:txBody>
       </p:sp>
     </p:spTree>
     <p:extLst>
       <p:ext uri="{BB962C8B-B14F-4D97-AF65-F5344CB8AC3E}">
-        <p14:creationId xmlns:p14="http://schemas.microsoft.com/office/powerpoint/2010/main" val="2437479166"/>
+        <p14:creationId xmlns:p14="http://schemas.microsoft.com/office/powerpoint/2010/main" val="3108447499"/>
       </p:ext>
     </p:extLst>
   </p:cSld>
@@ -9756,11 +9738,11 @@
           <a:p>
             <a:r>
               <a:rPr lang="en-CA" dirty="0"/>
-              <a:t>4. </a:t>
+              <a:t>3. </a:t>
             </a:r>
             <a:r>
               <a:rPr lang="en-US" dirty="0"/>
-              <a:t>Limited Time Freebies!</a:t>
+              <a:t>Chord Progressions</a:t>
             </a:r>
             <a:endParaRPr lang="en-CA" dirty="0"/>
           </a:p>
@@ -9782,14 +9764,11 @@
             <p:ph idx="1"/>
           </p:nvPr>
         </p:nvSpPr>
-        <p:spPr>
-          <a:xfrm>
-            <a:off x="838199" y="1825625"/>
-            <a:ext cx="10757687" cy="4351338"/>
-          </a:xfrm>
-        </p:spPr>
+        <p:spPr/>
         <p:txBody>
-          <a:bodyPr/>
+          <a:bodyPr>
+            <a:normAutofit/>
+          </a:bodyPr>
           <a:lstStyle/>
           <a:p>
             <a:pPr marL="0" indent="0">
@@ -9797,7 +9776,7 @@
             </a:pPr>
             <a:r>
               <a:rPr lang="en-CA" dirty="0"/>
-              <a:t>Checking is expensive, but how about free hints?</a:t>
+              <a:t>Now for something catchy…</a:t>
             </a:r>
             <a:br>
               <a:rPr lang="en-CA" dirty="0"/>
@@ -9807,38 +9786,35 @@
           <a:p>
             <a:r>
               <a:rPr lang="en-CA" dirty="0"/>
+              <a:t>Consider the silence before we embark on a musical journey…it is essential for both planning too!</a:t>
+            </a:r>
+            <a:br>
+              <a:rPr lang="en-CA" dirty="0"/>
+            </a:br>
+            <a:endParaRPr lang="en-CA" dirty="0"/>
+          </a:p>
+          <a:p>
+            <a:r>
+              <a:rPr lang="en-CA" dirty="0"/>
               <a:t>Create the </a:t>
             </a:r>
             <a:r>
-              <a:rPr lang="en-CA" b="1" dirty="0" err="1">
+              <a:rPr lang="en-CA" b="1" dirty="0">
                 <a:solidFill>
                   <a:schemeClr val="accent4"/>
                 </a:solidFill>
               </a:rPr>
-              <a:t>evenodd</a:t>
+              <a:t>progress</a:t>
             </a:r>
             <a:r>
               <a:rPr lang="en-CA" dirty="0"/>
-              <a:t> sensing action to detect the </a:t>
-            </a:r>
-            <a:r>
-              <a:rPr lang="en-CA" b="1" dirty="0">
-                <a:solidFill>
-                  <a:schemeClr val="accent2"/>
-                </a:solidFill>
-              </a:rPr>
-              <a:t>even</a:t>
-            </a:r>
-            <a:r>
-              <a:rPr lang="en-CA" dirty="0"/>
-              <a:t> predicate</a:t>
-            </a:r>
-            <a:br>
-              <a:rPr lang="en-CA" dirty="0"/>
-            </a:br>
-            <a:br>
-              <a:rPr lang="en-CA" dirty="0"/>
-            </a:br>
+              <a:t> action to progress from one chord to the next</a:t>
+            </a:r>
+          </a:p>
+          <a:p>
+            <a:pPr marL="0" indent="0">
+              <a:buNone/>
+            </a:pPr>
             <a:endParaRPr lang="en-CA" dirty="0"/>
           </a:p>
           <a:p>
@@ -9846,158 +9822,23 @@
               <a:buNone/>
             </a:pPr>
             <a:r>
-              <a:rPr lang="en-CA" dirty="0"/>
-              <a:t>“If a location is even, then it has 2 or 4.</a:t>
-            </a:r>
-            <a:br>
-              <a:rPr lang="en-CA" dirty="0"/>
-            </a:br>
-            <a:r>
-              <a:rPr lang="en-CA" dirty="0"/>
-              <a:t>   Otherwise, it’s odd and has 1 or 3”</a:t>
-            </a:r>
+              <a:rPr lang="en-CA" sz="2800" dirty="0"/>
+              <a:t>http://editor.planning.domains/planning-course/temporal/pop</a:t>
+            </a:r>
+            <a:endParaRPr lang="en-CA" dirty="0"/>
           </a:p>
         </p:txBody>
       </p:sp>
-      <p:pic>
-        <p:nvPicPr>
-          <p:cNvPr id="3" name="Picture 2">
-            <a:extLst>
-              <a:ext uri="{FF2B5EF4-FFF2-40B4-BE49-F238E27FC236}">
-                <a16:creationId xmlns:a16="http://schemas.microsoft.com/office/drawing/2014/main" id="{6F976A52-E4F8-EEA5-8BBE-3532A8E2AC2F}"/>
-              </a:ext>
-            </a:extLst>
-          </p:cNvPr>
-          <p:cNvPicPr>
-            <a:picLocks noChangeAspect="1"/>
-          </p:cNvPicPr>
-          <p:nvPr/>
-        </p:nvPicPr>
-        <p:blipFill>
-          <a:blip r:embed="rId2"/>
-          <a:stretch>
-            <a:fillRect/>
-          </a:stretch>
-        </p:blipFill>
-        <p:spPr>
-          <a:xfrm>
-            <a:off x="1674310" y="3712415"/>
-            <a:ext cx="8843379" cy="2464548"/>
-          </a:xfrm>
-          <a:prstGeom prst="round2DiagRect">
-            <a:avLst>
-              <a:gd name="adj1" fmla="val 16667"/>
-              <a:gd name="adj2" fmla="val 0"/>
-            </a:avLst>
-          </a:prstGeom>
-          <a:ln w="88900" cap="sq">
-            <a:solidFill>
-              <a:srgbClr val="FFFFFF"/>
-            </a:solidFill>
-            <a:miter lim="800000"/>
-          </a:ln>
-          <a:effectLst>
-            <a:outerShdw blurRad="254000" algn="tl" rotWithShape="0">
-              <a:srgbClr val="000000">
-                <a:alpha val="43000"/>
-              </a:srgbClr>
-            </a:outerShdw>
-          </a:effectLst>
-        </p:spPr>
-      </p:pic>
     </p:spTree>
     <p:extLst>
       <p:ext uri="{BB962C8B-B14F-4D97-AF65-F5344CB8AC3E}">
-        <p14:creationId xmlns:p14="http://schemas.microsoft.com/office/powerpoint/2010/main" val="2967719754"/>
+        <p14:creationId xmlns:p14="http://schemas.microsoft.com/office/powerpoint/2010/main" val="2049898440"/>
       </p:ext>
     </p:extLst>
   </p:cSld>
   <p:clrMapOvr>
     <a:masterClrMapping/>
   </p:clrMapOvr>
-  <p:timing>
-    <p:tnLst>
-      <p:par>
-        <p:cTn id="1" dur="indefinite" restart="never" nodeType="tmRoot">
-          <p:childTnLst>
-            <p:seq concurrent="1" nextAc="seek">
-              <p:cTn id="2" dur="indefinite" nodeType="mainSeq">
-                <p:childTnLst>
-                  <p:par>
-                    <p:cTn id="3" fill="hold">
-                      <p:stCondLst>
-                        <p:cond delay="indefinite"/>
-                      </p:stCondLst>
-                      <p:childTnLst>
-                        <p:par>
-                          <p:cTn id="4" fill="hold">
-                            <p:stCondLst>
-                              <p:cond delay="0"/>
-                            </p:stCondLst>
-                            <p:childTnLst>
-                              <p:par>
-                                <p:cTn id="5" presetID="10" presetClass="entr" presetSubtype="0" fill="hold" nodeType="clickEffect">
-                                  <p:stCondLst>
-                                    <p:cond delay="0"/>
-                                  </p:stCondLst>
-                                  <p:childTnLst>
-                                    <p:set>
-                                      <p:cBhvr>
-                                        <p:cTn id="6" dur="1" fill="hold">
-                                          <p:stCondLst>
-                                            <p:cond delay="0"/>
-                                          </p:stCondLst>
-                                        </p:cTn>
-                                        <p:tgtEl>
-                                          <p:spTgt spid="3"/>
-                                        </p:tgtEl>
-                                        <p:attrNameLst>
-                                          <p:attrName>style.visibility</p:attrName>
-                                        </p:attrNameLst>
-                                      </p:cBhvr>
-                                      <p:to>
-                                        <p:strVal val="visible"/>
-                                      </p:to>
-                                    </p:set>
-                                    <p:animEffect transition="in" filter="fade">
-                                      <p:cBhvr>
-                                        <p:cTn id="7" dur="500"/>
-                                        <p:tgtEl>
-                                          <p:spTgt spid="3"/>
-                                        </p:tgtEl>
-                                      </p:cBhvr>
-                                    </p:animEffect>
-                                  </p:childTnLst>
-                                </p:cTn>
-                              </p:par>
-                            </p:childTnLst>
-                          </p:cTn>
-                        </p:par>
-                      </p:childTnLst>
-                    </p:cTn>
-                  </p:par>
-                </p:childTnLst>
-              </p:cTn>
-              <p:prevCondLst>
-                <p:cond evt="onPrev" delay="0">
-                  <p:tgtEl>
-                    <p:sldTgt/>
-                  </p:tgtEl>
-                </p:cond>
-              </p:prevCondLst>
-              <p:nextCondLst>
-                <p:cond evt="onNext" delay="0">
-                  <p:tgtEl>
-                    <p:sldTgt/>
-                  </p:tgtEl>
-                </p:cond>
-              </p:nextCondLst>
-            </p:seq>
-          </p:childTnLst>
-        </p:cTn>
-      </p:par>
-    </p:tnLst>
-  </p:timing>
 </p:sld>
 </file>
 
@@ -10056,7 +9897,7 @@
             </a:pPr>
             <a:r>
               <a:rPr lang="en-CA" sz="2800" dirty="0"/>
-              <a:t>http://editor.planning.domains/planning-course/ppos/evenodd</a:t>
+              <a:t>http://editor.planning.domains/planning-course/temporal/itsahit</a:t>
             </a:r>
           </a:p>
         </p:txBody>
@@ -10064,7 +9905,7 @@
     </p:spTree>
     <p:extLst>
       <p:ext uri="{BB962C8B-B14F-4D97-AF65-F5344CB8AC3E}">
-        <p14:creationId xmlns:p14="http://schemas.microsoft.com/office/powerpoint/2010/main" val="646542654"/>
+        <p14:creationId xmlns:p14="http://schemas.microsoft.com/office/powerpoint/2010/main" val="2437479166"/>
       </p:ext>
     </p:extLst>
   </p:cSld>
@@ -10087,96 +9928,6 @@
 </file>
 
 <file path=ppt/slides/slide16.xml><?xml version="1.0" encoding="utf-8"?>
-<p:sld xmlns:a="http://schemas.openxmlformats.org/drawingml/2006/main" xmlns:r="http://schemas.openxmlformats.org/officeDocument/2006/relationships" xmlns:p="http://schemas.openxmlformats.org/presentationml/2006/main">
-  <p:cSld>
-    <p:spTree>
-      <p:nvGrpSpPr>
-        <p:cNvPr id="1" name=""/>
-        <p:cNvGrpSpPr/>
-        <p:nvPr/>
-      </p:nvGrpSpPr>
-      <p:grpSpPr>
-        <a:xfrm>
-          <a:off x="0" y="0"/>
-          <a:ext cx="0" cy="0"/>
-          <a:chOff x="0" y="0"/>
-          <a:chExt cx="0" cy="0"/>
-        </a:xfrm>
-      </p:grpSpPr>
-      <p:sp>
-        <p:nvSpPr>
-          <p:cNvPr id="5" name="Content Placeholder 4">
-            <a:extLst>
-              <a:ext uri="{FF2B5EF4-FFF2-40B4-BE49-F238E27FC236}">
-                <a16:creationId xmlns:a16="http://schemas.microsoft.com/office/drawing/2014/main" id="{916B2140-6178-6477-FAC2-4FC081B9C2C5}"/>
-              </a:ext>
-            </a:extLst>
-          </p:cNvPr>
-          <p:cNvSpPr>
-            <a:spLocks noGrp="1"/>
-          </p:cNvSpPr>
-          <p:nvPr>
-            <p:ph idx="1"/>
-          </p:nvPr>
-        </p:nvSpPr>
-        <p:spPr/>
-        <p:txBody>
-          <a:bodyPr/>
-          <a:lstStyle/>
-          <a:p>
-            <a:pPr marL="0" indent="0">
-              <a:buNone/>
-            </a:pPr>
-            <a:endParaRPr lang="en-CA" dirty="0"/>
-          </a:p>
-          <a:p>
-            <a:endParaRPr lang="en-CA" dirty="0"/>
-          </a:p>
-          <a:p>
-            <a:endParaRPr lang="en-CA" dirty="0"/>
-          </a:p>
-          <a:p>
-            <a:pPr marL="0" indent="0" algn="ctr">
-              <a:buNone/>
-            </a:pPr>
-            <a:r>
-              <a:rPr lang="en-CA" sz="2800" dirty="0"/>
-              <a:t>http://editor.planning.domains/planning-course/ppos/</a:t>
-            </a:r>
-            <a:r>
-              <a:rPr lang="en-CA" dirty="0"/>
-              <a:t>oddeven</a:t>
-            </a:r>
-            <a:endParaRPr lang="en-CA" sz="2800" dirty="0"/>
-          </a:p>
-        </p:txBody>
-      </p:sp>
-    </p:spTree>
-    <p:extLst>
-      <p:ext uri="{BB962C8B-B14F-4D97-AF65-F5344CB8AC3E}">
-        <p14:creationId xmlns:p14="http://schemas.microsoft.com/office/powerpoint/2010/main" val="3770023970"/>
-      </p:ext>
-    </p:extLst>
-  </p:cSld>
-  <p:clrMapOvr>
-    <a:masterClrMapping/>
-  </p:clrMapOvr>
-  <mc:AlternateContent xmlns:mc="http://schemas.openxmlformats.org/markup-compatibility/2006" xmlns:p14="http://schemas.microsoft.com/office/powerpoint/2010/main">
-    <mc:Choice Requires="p14">
-      <p:transition spd="med" p14:dur="700">
-        <p:fade/>
-      </p:transition>
-    </mc:Choice>
-    <mc:Fallback xmlns="">
-      <p:transition spd="med">
-        <p:fade/>
-      </p:transition>
-    </mc:Fallback>
-  </mc:AlternateContent>
-</p:sld>
-</file>
-
-<file path=ppt/slides/slide17.xml><?xml version="1.0" encoding="utf-8"?>
 <p:sld xmlns:a="http://schemas.openxmlformats.org/drawingml/2006/main" xmlns:r="http://schemas.openxmlformats.org/officeDocument/2006/relationships" xmlns:p="http://schemas.openxmlformats.org/presentationml/2006/main" showMasterSp="0">
   <p:cSld>
     <p:spTree>
@@ -10216,11 +9967,321 @@
           <a:p>
             <a:r>
               <a:rPr lang="en-CA" dirty="0"/>
+              <a:t>4. Time to break</a:t>
+            </a:r>
+            <a:br>
+              <a:rPr lang="en-CA" dirty="0"/>
+            </a:br>
+            <a:r>
+              <a:rPr lang="en-CA" dirty="0"/>
+              <a:t>     the rules!</a:t>
+            </a:r>
+          </a:p>
+        </p:txBody>
+      </p:sp>
+      <p:sp>
+        <p:nvSpPr>
+          <p:cNvPr id="5" name="Content Placeholder 4">
+            <a:extLst>
+              <a:ext uri="{FF2B5EF4-FFF2-40B4-BE49-F238E27FC236}">
+                <a16:creationId xmlns:a16="http://schemas.microsoft.com/office/drawing/2014/main" id="{916B2140-6178-6477-FAC2-4FC081B9C2C5}"/>
+              </a:ext>
+            </a:extLst>
+          </p:cNvPr>
+          <p:cNvSpPr>
+            <a:spLocks noGrp="1"/>
+          </p:cNvSpPr>
+          <p:nvPr>
+            <p:ph idx="1"/>
+          </p:nvPr>
+        </p:nvSpPr>
+        <p:spPr>
+          <a:xfrm>
+            <a:off x="838199" y="1825625"/>
+            <a:ext cx="10757687" cy="4351338"/>
+          </a:xfrm>
+        </p:spPr>
+        <p:txBody>
+          <a:bodyPr>
+            <a:normAutofit/>
+          </a:bodyPr>
+          <a:lstStyle/>
+          <a:p>
+            <a:pPr marL="0" indent="0">
+              <a:buNone/>
+            </a:pPr>
+            <a:br>
+              <a:rPr lang="en-CA" dirty="0"/>
+            </a:br>
+            <a:r>
+              <a:rPr lang="en-CA" dirty="0"/>
+              <a:t>Not </a:t>
+            </a:r>
+            <a:r>
+              <a:rPr lang="en-CA" i="1" dirty="0"/>
+              <a:t>every</a:t>
+            </a:r>
+            <a:r>
+              <a:rPr lang="en-CA" dirty="0"/>
+              <a:t> note needs to come</a:t>
+            </a:r>
+            <a:br>
+              <a:rPr lang="en-CA" dirty="0"/>
+            </a:br>
+            <a:r>
+              <a:rPr lang="en-CA" dirty="0"/>
+              <a:t>from the chord. Live a little!</a:t>
+            </a:r>
+            <a:br>
+              <a:rPr lang="en-CA" dirty="0"/>
+            </a:br>
+            <a:endParaRPr lang="en-CA" dirty="0"/>
+          </a:p>
+          <a:p>
+            <a:r>
+              <a:rPr lang="en-CA" dirty="0"/>
+              <a:t>Problem file is modified to count the # of cheats (current &amp; max)</a:t>
+            </a:r>
+            <a:br>
+              <a:rPr lang="en-CA" dirty="0"/>
+            </a:br>
+            <a:endParaRPr lang="en-CA" dirty="0"/>
+          </a:p>
+          <a:p>
+            <a:r>
+              <a:rPr lang="en-CA" dirty="0"/>
+              <a:t>Create a new </a:t>
+            </a:r>
+            <a:r>
+              <a:rPr lang="en-CA" b="1" dirty="0">
+                <a:solidFill>
+                  <a:schemeClr val="accent4"/>
+                </a:solidFill>
+              </a:rPr>
+              <a:t>play-cheat-note</a:t>
+            </a:r>
+            <a:r>
+              <a:rPr lang="en-CA" dirty="0"/>
+              <a:t> action modelled off of </a:t>
+            </a:r>
+            <a:r>
+              <a:rPr lang="en-CA" b="1" dirty="0">
+                <a:solidFill>
+                  <a:schemeClr val="accent4"/>
+                </a:solidFill>
+              </a:rPr>
+              <a:t>play-note</a:t>
+            </a:r>
+            <a:br>
+              <a:rPr lang="en-CA" dirty="0"/>
+            </a:br>
+            <a:endParaRPr lang="en-CA" dirty="0"/>
+          </a:p>
+          <a:p>
+            <a:pPr marL="0" indent="0" algn="ctr">
+              <a:buNone/>
+            </a:pPr>
+            <a:r>
+              <a:rPr lang="en-CA" sz="2800" dirty="0"/>
+              <a:t>http://editor.planning.domains/planning-course/temporal/cheater</a:t>
+            </a:r>
+            <a:endParaRPr lang="en-CA" dirty="0"/>
+          </a:p>
+          <a:p>
+            <a:endParaRPr lang="en-CA" dirty="0"/>
+          </a:p>
+        </p:txBody>
+      </p:sp>
+      <p:pic>
+        <p:nvPicPr>
+          <p:cNvPr id="1026" name="Picture 2" descr="Taste-the-jazz GIFs - Get the best GIF on GIPHY">
+            <a:extLst>
+              <a:ext uri="{FF2B5EF4-FFF2-40B4-BE49-F238E27FC236}">
+                <a16:creationId xmlns:a16="http://schemas.microsoft.com/office/drawing/2014/main" id="{508068C4-C319-E35C-41A8-FA2CBA1E77F1}"/>
+              </a:ext>
+            </a:extLst>
+          </p:cNvPr>
+          <p:cNvPicPr>
+            <a:picLocks noChangeAspect="1" noChangeArrowheads="1"/>
+          </p:cNvPicPr>
+          <p:nvPr/>
+        </p:nvPicPr>
+        <p:blipFill>
+          <a:blip r:embed="rId2">
+            <a:extLst>
+              <a:ext uri="{28A0092B-C50C-407E-A947-70E740481C1C}">
+                <a14:useLocalDpi xmlns:a14="http://schemas.microsoft.com/office/drawing/2010/main" val="0"/>
+              </a:ext>
+            </a:extLst>
+          </a:blip>
+          <a:srcRect/>
+          <a:stretch>
+            <a:fillRect/>
+          </a:stretch>
+        </p:blipFill>
+        <p:spPr bwMode="auto">
+          <a:xfrm>
+            <a:off x="6481823" y="784"/>
+            <a:ext cx="5710177" cy="3211975"/>
+          </a:xfrm>
+          <a:prstGeom prst="rect">
+            <a:avLst/>
+          </a:prstGeom>
+          <a:noFill/>
+          <a:extLst>
+            <a:ext uri="{909E8E84-426E-40DD-AFC4-6F175D3DCCD1}">
+              <a14:hiddenFill xmlns:a14="http://schemas.microsoft.com/office/drawing/2010/main">
+                <a:solidFill>
+                  <a:srgbClr val="FFFFFF"/>
+                </a:solidFill>
+              </a14:hiddenFill>
+            </a:ext>
+          </a:extLst>
+        </p:spPr>
+      </p:pic>
+    </p:spTree>
+    <p:extLst>
+      <p:ext uri="{BB962C8B-B14F-4D97-AF65-F5344CB8AC3E}">
+        <p14:creationId xmlns:p14="http://schemas.microsoft.com/office/powerpoint/2010/main" val="2967719754"/>
+      </p:ext>
+    </p:extLst>
+  </p:cSld>
+  <p:clrMapOvr>
+    <a:masterClrMapping/>
+  </p:clrMapOvr>
+</p:sld>
+</file>
+
+<file path=ppt/slides/slide17.xml><?xml version="1.0" encoding="utf-8"?>
+<p:sld xmlns:a="http://schemas.openxmlformats.org/drawingml/2006/main" xmlns:r="http://schemas.openxmlformats.org/officeDocument/2006/relationships" xmlns:p="http://schemas.openxmlformats.org/presentationml/2006/main" showMasterSp="0">
+  <p:cSld>
+    <p:spTree>
+      <p:nvGrpSpPr>
+        <p:cNvPr id="1" name=""/>
+        <p:cNvGrpSpPr/>
+        <p:nvPr/>
+      </p:nvGrpSpPr>
+      <p:grpSpPr>
+        <a:xfrm>
+          <a:off x="0" y="0"/>
+          <a:ext cx="0" cy="0"/>
+          <a:chOff x="0" y="0"/>
+          <a:chExt cx="0" cy="0"/>
+        </a:xfrm>
+      </p:grpSpPr>
+      <p:sp>
+        <p:nvSpPr>
+          <p:cNvPr id="5" name="Content Placeholder 4">
+            <a:extLst>
+              <a:ext uri="{FF2B5EF4-FFF2-40B4-BE49-F238E27FC236}">
+                <a16:creationId xmlns:a16="http://schemas.microsoft.com/office/drawing/2014/main" id="{916B2140-6178-6477-FAC2-4FC081B9C2C5}"/>
+              </a:ext>
+            </a:extLst>
+          </p:cNvPr>
+          <p:cNvSpPr>
+            <a:spLocks noGrp="1"/>
+          </p:cNvSpPr>
+          <p:nvPr>
+            <p:ph idx="1"/>
+          </p:nvPr>
+        </p:nvSpPr>
+        <p:spPr/>
+        <p:txBody>
+          <a:bodyPr/>
+          <a:lstStyle/>
+          <a:p>
+            <a:pPr marL="0" indent="0">
+              <a:buNone/>
+            </a:pPr>
+            <a:endParaRPr lang="en-CA" dirty="0"/>
+          </a:p>
+          <a:p>
+            <a:endParaRPr lang="en-CA" dirty="0"/>
+          </a:p>
+          <a:p>
+            <a:endParaRPr lang="en-CA" dirty="0"/>
+          </a:p>
+          <a:p>
+            <a:pPr marL="0" indent="0" algn="ctr">
+              <a:buNone/>
+            </a:pPr>
+            <a:r>
+              <a:rPr lang="en-CA" sz="2800" dirty="0"/>
+              <a:t>http://editor.planning.domains/planning-course/temporal/thatsjazz</a:t>
+            </a:r>
+          </a:p>
+        </p:txBody>
+      </p:sp>
+    </p:spTree>
+    <p:extLst>
+      <p:ext uri="{BB962C8B-B14F-4D97-AF65-F5344CB8AC3E}">
+        <p14:creationId xmlns:p14="http://schemas.microsoft.com/office/powerpoint/2010/main" val="3770023970"/>
+      </p:ext>
+    </p:extLst>
+  </p:cSld>
+  <p:clrMapOvr>
+    <a:masterClrMapping/>
+  </p:clrMapOvr>
+  <mc:AlternateContent xmlns:mc="http://schemas.openxmlformats.org/markup-compatibility/2006" xmlns:p14="http://schemas.microsoft.com/office/powerpoint/2010/main">
+    <mc:Choice Requires="p14">
+      <p:transition spd="med" p14:dur="700">
+        <p:fade/>
+      </p:transition>
+    </mc:Choice>
+    <mc:Fallback xmlns="">
+      <p:transition spd="med">
+        <p:fade/>
+      </p:transition>
+    </mc:Fallback>
+  </mc:AlternateContent>
+</p:sld>
+</file>
+
+<file path=ppt/slides/slide18.xml><?xml version="1.0" encoding="utf-8"?>
+<p:sld xmlns:a="http://schemas.openxmlformats.org/drawingml/2006/main" xmlns:r="http://schemas.openxmlformats.org/officeDocument/2006/relationships" xmlns:p="http://schemas.openxmlformats.org/presentationml/2006/main" showMasterSp="0">
+  <p:cSld>
+    <p:spTree>
+      <p:nvGrpSpPr>
+        <p:cNvPr id="1" name=""/>
+        <p:cNvGrpSpPr/>
+        <p:nvPr/>
+      </p:nvGrpSpPr>
+      <p:grpSpPr>
+        <a:xfrm>
+          <a:off x="0" y="0"/>
+          <a:ext cx="0" cy="0"/>
+          <a:chOff x="0" y="0"/>
+          <a:chExt cx="0" cy="0"/>
+        </a:xfrm>
+      </p:grpSpPr>
+      <p:sp>
+        <p:nvSpPr>
+          <p:cNvPr id="4" name="Title 3">
+            <a:extLst>
+              <a:ext uri="{FF2B5EF4-FFF2-40B4-BE49-F238E27FC236}">
+                <a16:creationId xmlns:a16="http://schemas.microsoft.com/office/drawing/2014/main" id="{80EAC0C6-7B8A-1444-CF6E-AFD7613F9128}"/>
+              </a:ext>
+            </a:extLst>
+          </p:cNvPr>
+          <p:cNvSpPr>
+            <a:spLocks noGrp="1"/>
+          </p:cNvSpPr>
+          <p:nvPr>
+            <p:ph type="title"/>
+          </p:nvPr>
+        </p:nvSpPr>
+        <p:spPr/>
+        <p:txBody>
+          <a:bodyPr/>
+          <a:lstStyle/>
+          <a:p>
+            <a:r>
+              <a:rPr lang="en-CA" dirty="0"/>
               <a:t>5. </a:t>
             </a:r>
             <a:r>
               <a:rPr lang="en-US" dirty="0"/>
-              <a:t>Time to explore…</a:t>
+              <a:t>Return to the tonic</a:t>
             </a:r>
             <a:endParaRPr lang="en-CA" dirty="0"/>
           </a:p>
@@ -10244,7 +10305,9 @@
         </p:nvSpPr>
         <p:spPr/>
         <p:txBody>
-          <a:bodyPr/>
+          <a:bodyPr>
+            <a:normAutofit/>
+          </a:bodyPr>
           <a:lstStyle/>
           <a:p>
             <a:pPr marL="0" indent="0">
@@ -10252,7 +10315,31 @@
             </a:pPr>
             <a:r>
               <a:rPr lang="en-CA" dirty="0"/>
-              <a:t>Time to play! Mess around with the </a:t>
+              <a:t>To make it a bit more “pop”-y, let’s make sure chords get their tonic note played – </a:t>
+            </a:r>
+            <a:r>
+              <a:rPr lang="en-CA" i="1" dirty="0"/>
+              <a:t>tonic</a:t>
+            </a:r>
+            <a:r>
+              <a:rPr lang="en-CA" dirty="0"/>
+              <a:t> is the base defining note of a chord</a:t>
+            </a:r>
+            <a:br>
+              <a:rPr lang="en-CA" dirty="0"/>
+            </a:br>
+            <a:endParaRPr lang="en-CA" dirty="0"/>
+          </a:p>
+          <a:p>
+            <a:r>
+              <a:rPr lang="en-CA" dirty="0"/>
+              <a:t>Check the problem file for the new tonic stuff</a:t>
+            </a:r>
+          </a:p>
+          <a:p>
+            <a:r>
+              <a:rPr lang="en-CA" dirty="0"/>
+              <a:t>Check the changes to the </a:t>
             </a:r>
             <a:r>
               <a:rPr lang="en-CA" b="1" dirty="0">
@@ -10260,11 +10347,17 @@
                   <a:schemeClr val="accent4"/>
                 </a:solidFill>
               </a:rPr>
-              <a:t>check-setup</a:t>
+              <a:t>progress</a:t>
             </a:r>
             <a:r>
               <a:rPr lang="en-CA" dirty="0"/>
-              <a:t> and </a:t>
+              <a:t> action</a:t>
+            </a:r>
+          </a:p>
+          <a:p>
+            <a:r>
+              <a:rPr lang="en-CA" dirty="0"/>
+              <a:t>Create the new </a:t>
             </a:r>
             <a:r>
               <a:rPr lang="en-CA" b="1" dirty="0">
@@ -10272,39 +10365,11 @@
                   <a:schemeClr val="accent4"/>
                 </a:solidFill>
               </a:rPr>
-              <a:t>teleport</a:t>
+              <a:t>play-tonic-note</a:t>
             </a:r>
             <a:r>
               <a:rPr lang="en-CA" dirty="0"/>
-              <a:t> preconditions to change the budget, as well as the initial / goal.</a:t>
-            </a:r>
-            <a:br>
-              <a:rPr lang="en-CA" dirty="0"/>
-            </a:br>
-            <a:endParaRPr lang="en-CA" dirty="0"/>
-          </a:p>
-          <a:p>
-            <a:r>
-              <a:rPr lang="en-CA" dirty="0"/>
-              <a:t>How few check actions can you get away with?</a:t>
-            </a:r>
-          </a:p>
-          <a:p>
-            <a:r>
-              <a:rPr lang="en-CA" dirty="0"/>
-              <a:t>Impact of unlimited teleportation?</a:t>
-            </a:r>
-          </a:p>
-          <a:p>
-            <a:r>
-              <a:rPr lang="en-CA" dirty="0"/>
-              <a:t>Explore solutions (partial &amp; full) on just one quadrant.</a:t>
-            </a:r>
-          </a:p>
-          <a:p>
-            <a:r>
-              <a:rPr lang="en-CA" dirty="0"/>
-              <a:t>Can you solve 3 quadrants? All 4?</a:t>
+              <a:t> action</a:t>
             </a:r>
           </a:p>
           <a:p>
@@ -10319,7 +10384,7 @@
             </a:pPr>
             <a:r>
               <a:rPr lang="en-CA" sz="2800" dirty="0"/>
-              <a:t>http://editor.planning.domains/planning-course/ppos/explore</a:t>
+              <a:t>http://editor.planning.domains/planning-course/temporal/ginand</a:t>
             </a:r>
             <a:endParaRPr lang="en-CA" dirty="0"/>
           </a:p>
@@ -10335,284 +10400,10 @@
   <p:clrMapOvr>
     <a:masterClrMapping/>
   </p:clrMapOvr>
-  <p:timing>
-    <p:tnLst>
-      <p:par>
-        <p:cTn id="1" dur="indefinite" restart="never" nodeType="tmRoot">
-          <p:childTnLst>
-            <p:seq concurrent="1" nextAc="seek">
-              <p:cTn id="2" dur="indefinite" nodeType="mainSeq">
-                <p:childTnLst>
-                  <p:par>
-                    <p:cTn id="3" fill="hold">
-                      <p:stCondLst>
-                        <p:cond delay="indefinite"/>
-                      </p:stCondLst>
-                      <p:childTnLst>
-                        <p:par>
-                          <p:cTn id="4" fill="hold">
-                            <p:stCondLst>
-                              <p:cond delay="0"/>
-                            </p:stCondLst>
-                            <p:childTnLst>
-                              <p:par>
-                                <p:cTn id="5" presetID="10" presetClass="entr" presetSubtype="0" fill="hold" nodeType="clickEffect">
-                                  <p:stCondLst>
-                                    <p:cond delay="0"/>
-                                  </p:stCondLst>
-                                  <p:childTnLst>
-                                    <p:set>
-                                      <p:cBhvr>
-                                        <p:cTn id="6" dur="1" fill="hold">
-                                          <p:stCondLst>
-                                            <p:cond delay="0"/>
-                                          </p:stCondLst>
-                                        </p:cTn>
-                                        <p:tgtEl>
-                                          <p:spTgt spid="5">
-                                            <p:txEl>
-                                              <p:pRg st="1" end="1"/>
-                                            </p:txEl>
-                                          </p:spTgt>
-                                        </p:tgtEl>
-                                        <p:attrNameLst>
-                                          <p:attrName>style.visibility</p:attrName>
-                                        </p:attrNameLst>
-                                      </p:cBhvr>
-                                      <p:to>
-                                        <p:strVal val="visible"/>
-                                      </p:to>
-                                    </p:set>
-                                    <p:animEffect transition="in" filter="fade">
-                                      <p:cBhvr>
-                                        <p:cTn id="7" dur="500"/>
-                                        <p:tgtEl>
-                                          <p:spTgt spid="5">
-                                            <p:txEl>
-                                              <p:pRg st="1" end="1"/>
-                                            </p:txEl>
-                                          </p:spTgt>
-                                        </p:tgtEl>
-                                      </p:cBhvr>
-                                    </p:animEffect>
-                                  </p:childTnLst>
-                                </p:cTn>
-                              </p:par>
-                            </p:childTnLst>
-                          </p:cTn>
-                        </p:par>
-                      </p:childTnLst>
-                    </p:cTn>
-                  </p:par>
-                  <p:par>
-                    <p:cTn id="8" fill="hold">
-                      <p:stCondLst>
-                        <p:cond delay="indefinite"/>
-                      </p:stCondLst>
-                      <p:childTnLst>
-                        <p:par>
-                          <p:cTn id="9" fill="hold">
-                            <p:stCondLst>
-                              <p:cond delay="0"/>
-                            </p:stCondLst>
-                            <p:childTnLst>
-                              <p:par>
-                                <p:cTn id="10" presetID="10" presetClass="entr" presetSubtype="0" fill="hold" nodeType="clickEffect">
-                                  <p:stCondLst>
-                                    <p:cond delay="0"/>
-                                  </p:stCondLst>
-                                  <p:childTnLst>
-                                    <p:set>
-                                      <p:cBhvr>
-                                        <p:cTn id="11" dur="1" fill="hold">
-                                          <p:stCondLst>
-                                            <p:cond delay="0"/>
-                                          </p:stCondLst>
-                                        </p:cTn>
-                                        <p:tgtEl>
-                                          <p:spTgt spid="5">
-                                            <p:txEl>
-                                              <p:pRg st="2" end="2"/>
-                                            </p:txEl>
-                                          </p:spTgt>
-                                        </p:tgtEl>
-                                        <p:attrNameLst>
-                                          <p:attrName>style.visibility</p:attrName>
-                                        </p:attrNameLst>
-                                      </p:cBhvr>
-                                      <p:to>
-                                        <p:strVal val="visible"/>
-                                      </p:to>
-                                    </p:set>
-                                    <p:animEffect transition="in" filter="fade">
-                                      <p:cBhvr>
-                                        <p:cTn id="12" dur="500"/>
-                                        <p:tgtEl>
-                                          <p:spTgt spid="5">
-                                            <p:txEl>
-                                              <p:pRg st="2" end="2"/>
-                                            </p:txEl>
-                                          </p:spTgt>
-                                        </p:tgtEl>
-                                      </p:cBhvr>
-                                    </p:animEffect>
-                                  </p:childTnLst>
-                                </p:cTn>
-                              </p:par>
-                            </p:childTnLst>
-                          </p:cTn>
-                        </p:par>
-                      </p:childTnLst>
-                    </p:cTn>
-                  </p:par>
-                  <p:par>
-                    <p:cTn id="13" fill="hold">
-                      <p:stCondLst>
-                        <p:cond delay="indefinite"/>
-                      </p:stCondLst>
-                      <p:childTnLst>
-                        <p:par>
-                          <p:cTn id="14" fill="hold">
-                            <p:stCondLst>
-                              <p:cond delay="0"/>
-                            </p:stCondLst>
-                            <p:childTnLst>
-                              <p:par>
-                                <p:cTn id="15" presetID="10" presetClass="entr" presetSubtype="0" fill="hold" nodeType="clickEffect">
-                                  <p:stCondLst>
-                                    <p:cond delay="0"/>
-                                  </p:stCondLst>
-                                  <p:childTnLst>
-                                    <p:set>
-                                      <p:cBhvr>
-                                        <p:cTn id="16" dur="1" fill="hold">
-                                          <p:stCondLst>
-                                            <p:cond delay="0"/>
-                                          </p:stCondLst>
-                                        </p:cTn>
-                                        <p:tgtEl>
-                                          <p:spTgt spid="5">
-                                            <p:txEl>
-                                              <p:pRg st="3" end="3"/>
-                                            </p:txEl>
-                                          </p:spTgt>
-                                        </p:tgtEl>
-                                        <p:attrNameLst>
-                                          <p:attrName>style.visibility</p:attrName>
-                                        </p:attrNameLst>
-                                      </p:cBhvr>
-                                      <p:to>
-                                        <p:strVal val="visible"/>
-                                      </p:to>
-                                    </p:set>
-                                    <p:animEffect transition="in" filter="fade">
-                                      <p:cBhvr>
-                                        <p:cTn id="17" dur="500"/>
-                                        <p:tgtEl>
-                                          <p:spTgt spid="5">
-                                            <p:txEl>
-                                              <p:pRg st="3" end="3"/>
-                                            </p:txEl>
-                                          </p:spTgt>
-                                        </p:tgtEl>
-                                      </p:cBhvr>
-                                    </p:animEffect>
-                                  </p:childTnLst>
-                                </p:cTn>
-                              </p:par>
-                            </p:childTnLst>
-                          </p:cTn>
-                        </p:par>
-                      </p:childTnLst>
-                    </p:cTn>
-                  </p:par>
-                  <p:par>
-                    <p:cTn id="18" fill="hold">
-                      <p:stCondLst>
-                        <p:cond delay="indefinite"/>
-                      </p:stCondLst>
-                      <p:childTnLst>
-                        <p:par>
-                          <p:cTn id="19" fill="hold">
-                            <p:stCondLst>
-                              <p:cond delay="0"/>
-                            </p:stCondLst>
-                            <p:childTnLst>
-                              <p:par>
-                                <p:cTn id="20" presetID="10" presetClass="entr" presetSubtype="0" fill="hold" nodeType="clickEffect">
-                                  <p:stCondLst>
-                                    <p:cond delay="0"/>
-                                  </p:stCondLst>
-                                  <p:childTnLst>
-                                    <p:set>
-                                      <p:cBhvr>
-                                        <p:cTn id="21" dur="1" fill="hold">
-                                          <p:stCondLst>
-                                            <p:cond delay="0"/>
-                                          </p:stCondLst>
-                                        </p:cTn>
-                                        <p:tgtEl>
-                                          <p:spTgt spid="5">
-                                            <p:txEl>
-                                              <p:pRg st="4" end="4"/>
-                                            </p:txEl>
-                                          </p:spTgt>
-                                        </p:tgtEl>
-                                        <p:attrNameLst>
-                                          <p:attrName>style.visibility</p:attrName>
-                                        </p:attrNameLst>
-                                      </p:cBhvr>
-                                      <p:to>
-                                        <p:strVal val="visible"/>
-                                      </p:to>
-                                    </p:set>
-                                    <p:animEffect transition="in" filter="fade">
-                                      <p:cBhvr>
-                                        <p:cTn id="22" dur="500"/>
-                                        <p:tgtEl>
-                                          <p:spTgt spid="5">
-                                            <p:txEl>
-                                              <p:pRg st="4" end="4"/>
-                                            </p:txEl>
-                                          </p:spTgt>
-                                        </p:tgtEl>
-                                      </p:cBhvr>
-                                    </p:animEffect>
-                                  </p:childTnLst>
-                                </p:cTn>
-                              </p:par>
-                            </p:childTnLst>
-                          </p:cTn>
-                        </p:par>
-                      </p:childTnLst>
-                    </p:cTn>
-                  </p:par>
-                </p:childTnLst>
-              </p:cTn>
-              <p:prevCondLst>
-                <p:cond evt="onPrev" delay="0">
-                  <p:tgtEl>
-                    <p:sldTgt/>
-                  </p:tgtEl>
-                </p:cond>
-              </p:prevCondLst>
-              <p:nextCondLst>
-                <p:cond evt="onNext" delay="0">
-                  <p:tgtEl>
-                    <p:sldTgt/>
-                  </p:tgtEl>
-                </p:cond>
-              </p:nextCondLst>
-            </p:seq>
-          </p:childTnLst>
-        </p:cTn>
-      </p:par>
-    </p:tnLst>
-  </p:timing>
 </p:sld>
 </file>
 
-<file path=ppt/slides/slide18.xml><?xml version="1.0" encoding="utf-8"?>
+<file path=ppt/slides/slide19.xml><?xml version="1.0" encoding="utf-8"?>
 <p:sld xmlns:a="http://schemas.openxmlformats.org/drawingml/2006/main" xmlns:r="http://schemas.openxmlformats.org/officeDocument/2006/relationships" xmlns:p="http://schemas.openxmlformats.org/presentationml/2006/main" showMasterSp="0">
   <p:cSld>
     <p:spTree>
@@ -10629,16 +10420,71 @@
           <a:chExt cx="0" cy="0"/>
         </a:xfrm>
       </p:grpSpPr>
+      <p:sp>
+        <p:nvSpPr>
+          <p:cNvPr id="5" name="Content Placeholder 4">
+            <a:extLst>
+              <a:ext uri="{FF2B5EF4-FFF2-40B4-BE49-F238E27FC236}">
+                <a16:creationId xmlns:a16="http://schemas.microsoft.com/office/drawing/2014/main" id="{916B2140-6178-6477-FAC2-4FC081B9C2C5}"/>
+              </a:ext>
+            </a:extLst>
+          </p:cNvPr>
+          <p:cNvSpPr>
+            <a:spLocks noGrp="1"/>
+          </p:cNvSpPr>
+          <p:nvPr>
+            <p:ph idx="1"/>
+          </p:nvPr>
+        </p:nvSpPr>
+        <p:spPr/>
+        <p:txBody>
+          <a:bodyPr/>
+          <a:lstStyle/>
+          <a:p>
+            <a:pPr marL="0" indent="0">
+              <a:buNone/>
+            </a:pPr>
+            <a:endParaRPr lang="en-CA" dirty="0"/>
+          </a:p>
+          <a:p>
+            <a:endParaRPr lang="en-CA" dirty="0"/>
+          </a:p>
+          <a:p>
+            <a:endParaRPr lang="en-CA" dirty="0"/>
+          </a:p>
+          <a:p>
+            <a:pPr marL="0" indent="0" algn="ctr">
+              <a:buNone/>
+            </a:pPr>
+            <a:r>
+              <a:rPr lang="en-CA" sz="2800" dirty="0"/>
+              <a:t>http://editor.planning.domains/planning-course/temporal/itsahit</a:t>
+            </a:r>
+          </a:p>
+        </p:txBody>
+      </p:sp>
     </p:spTree>
     <p:extLst>
       <p:ext uri="{BB962C8B-B14F-4D97-AF65-F5344CB8AC3E}">
-        <p14:creationId xmlns:p14="http://schemas.microsoft.com/office/powerpoint/2010/main" val="1299345925"/>
+        <p14:creationId xmlns:p14="http://schemas.microsoft.com/office/powerpoint/2010/main" val="2059679680"/>
       </p:ext>
     </p:extLst>
   </p:cSld>
   <p:clrMapOvr>
     <a:masterClrMapping/>
   </p:clrMapOvr>
+  <mc:AlternateContent xmlns:mc="http://schemas.openxmlformats.org/markup-compatibility/2006" xmlns:p14="http://schemas.microsoft.com/office/powerpoint/2010/main">
+    <mc:Choice Requires="p14">
+      <p:transition spd="med" p14:dur="700">
+        <p:fade/>
+      </p:transition>
+    </mc:Choice>
+    <mc:Fallback xmlns="">
+      <p:transition spd="med">
+        <p:fade/>
+      </p:transition>
+    </mc:Fallback>
+  </mc:AlternateContent>
 </p:sld>
 </file>
 
@@ -10671,8 +10517,8 @@
         </p:nvSpPr>
         <p:spPr>
           <a:xfrm>
-            <a:off x="1190625" y="2086324"/>
-            <a:ext cx="9810750" cy="2685351"/>
+            <a:off x="1190625" y="1589522"/>
+            <a:ext cx="9810750" cy="3678956"/>
           </a:xfrm>
           <a:prstGeom prst="rect">
             <a:avLst/>
@@ -10724,6 +10570,21 @@
               <a:rPr lang="en-US" i="1" dirty="0"/>
               <a:t> &amp; optic</a:t>
             </a:r>
+            <a:br>
+              <a:rPr lang="en-US" i="1" dirty="0"/>
+            </a:br>
+            <a:endParaRPr lang="en-US" i="1" dirty="0"/>
+          </a:p>
+          <a:p>
+            <a:r>
+              <a:rPr lang="en-US" b="1" dirty="0"/>
+              <a:t>IMPORTANT: </a:t>
+            </a:r>
+            <a:r>
+              <a:rPr lang="en-US" dirty="0"/>
+              <a:t>use the “-T” option</a:t>
+            </a:r>
+            <a:endParaRPr lang="en-US" b="1" dirty="0"/>
           </a:p>
         </p:txBody>
       </p:sp>
@@ -10736,7 +10597,194 @@
 </p:sld>
 </file>
 
+<file path=ppt/slides/slide20.xml><?xml version="1.0" encoding="utf-8"?>
+<p:sld xmlns:a="http://schemas.openxmlformats.org/drawingml/2006/main" xmlns:r="http://schemas.openxmlformats.org/officeDocument/2006/relationships" xmlns:p="http://schemas.openxmlformats.org/presentationml/2006/main" showMasterSp="0">
+  <p:cSld>
+    <p:spTree>
+      <p:nvGrpSpPr>
+        <p:cNvPr id="1" name=""/>
+        <p:cNvGrpSpPr/>
+        <p:nvPr/>
+      </p:nvGrpSpPr>
+      <p:grpSpPr>
+        <a:xfrm>
+          <a:off x="0" y="0"/>
+          <a:ext cx="0" cy="0"/>
+          <a:chOff x="0" y="0"/>
+          <a:chExt cx="0" cy="0"/>
+        </a:xfrm>
+      </p:grpSpPr>
+      <p:sp>
+        <p:nvSpPr>
+          <p:cNvPr id="5" name="Content Placeholder 4">
+            <a:extLst>
+              <a:ext uri="{FF2B5EF4-FFF2-40B4-BE49-F238E27FC236}">
+                <a16:creationId xmlns:a16="http://schemas.microsoft.com/office/drawing/2014/main" id="{916B2140-6178-6477-FAC2-4FC081B9C2C5}"/>
+              </a:ext>
+            </a:extLst>
+          </p:cNvPr>
+          <p:cNvSpPr>
+            <a:spLocks noGrp="1"/>
+          </p:cNvSpPr>
+          <p:nvPr>
+            <p:ph idx="1"/>
+          </p:nvPr>
+        </p:nvSpPr>
+        <p:spPr>
+          <a:xfrm>
+            <a:off x="838200" y="3044640"/>
+            <a:ext cx="10515600" cy="768719"/>
+          </a:xfrm>
+        </p:spPr>
+        <p:txBody>
+          <a:bodyPr>
+            <a:normAutofit/>
+          </a:bodyPr>
+          <a:lstStyle/>
+          <a:p>
+            <a:pPr marL="0" indent="0" algn="ctr">
+              <a:buNone/>
+            </a:pPr>
+            <a:r>
+              <a:rPr lang="en-CA" sz="4800" dirty="0"/>
+              <a:t>Let’s Explore!!!</a:t>
+            </a:r>
+          </a:p>
+        </p:txBody>
+      </p:sp>
+    </p:spTree>
+    <p:extLst>
+      <p:ext uri="{BB962C8B-B14F-4D97-AF65-F5344CB8AC3E}">
+        <p14:creationId xmlns:p14="http://schemas.microsoft.com/office/powerpoint/2010/main" val="887251235"/>
+      </p:ext>
+    </p:extLst>
+  </p:cSld>
+  <p:clrMapOvr>
+    <a:masterClrMapping/>
+  </p:clrMapOvr>
+  <mc:AlternateContent xmlns:mc="http://schemas.openxmlformats.org/markup-compatibility/2006" xmlns:p14="http://schemas.microsoft.com/office/powerpoint/2010/main">
+    <mc:Choice Requires="p14">
+      <p:transition spd="med" p14:dur="700">
+        <p:fade/>
+      </p:transition>
+    </mc:Choice>
+    <mc:Fallback xmlns="">
+      <p:transition spd="med">
+        <p:fade/>
+      </p:transition>
+    </mc:Fallback>
+  </mc:AlternateContent>
+</p:sld>
+</file>
+
+<file path=ppt/slides/slide21.xml><?xml version="1.0" encoding="utf-8"?>
+<p:sld xmlns:a="http://schemas.openxmlformats.org/drawingml/2006/main" xmlns:r="http://schemas.openxmlformats.org/officeDocument/2006/relationships" xmlns:p="http://schemas.openxmlformats.org/presentationml/2006/main" showMasterSp="0">
+  <p:cSld>
+    <p:spTree>
+      <p:nvGrpSpPr>
+        <p:cNvPr id="1" name=""/>
+        <p:cNvGrpSpPr/>
+        <p:nvPr/>
+      </p:nvGrpSpPr>
+      <p:grpSpPr>
+        <a:xfrm>
+          <a:off x="0" y="0"/>
+          <a:ext cx="0" cy="0"/>
+          <a:chOff x="0" y="0"/>
+          <a:chExt cx="0" cy="0"/>
+        </a:xfrm>
+      </p:grpSpPr>
+    </p:spTree>
+    <p:extLst>
+      <p:ext uri="{BB962C8B-B14F-4D97-AF65-F5344CB8AC3E}">
+        <p14:creationId xmlns:p14="http://schemas.microsoft.com/office/powerpoint/2010/main" val="1299345925"/>
+      </p:ext>
+    </p:extLst>
+  </p:cSld>
+  <p:clrMapOvr>
+    <a:masterClrMapping/>
+  </p:clrMapOvr>
+</p:sld>
+</file>
+
 <file path=ppt/slides/slide3.xml><?xml version="1.0" encoding="utf-8"?>
+<p:sld xmlns:a="http://schemas.openxmlformats.org/drawingml/2006/main" xmlns:r="http://schemas.openxmlformats.org/officeDocument/2006/relationships" xmlns:p="http://schemas.openxmlformats.org/presentationml/2006/main" showMasterSp="0">
+  <p:cSld>
+    <p:spTree>
+      <p:nvGrpSpPr>
+        <p:cNvPr id="1" name=""/>
+        <p:cNvGrpSpPr/>
+        <p:nvPr/>
+      </p:nvGrpSpPr>
+      <p:grpSpPr>
+        <a:xfrm>
+          <a:off x="0" y="0"/>
+          <a:ext cx="0" cy="0"/>
+          <a:chOff x="0" y="0"/>
+          <a:chExt cx="0" cy="0"/>
+        </a:xfrm>
+      </p:grpSpPr>
+      <p:pic>
+        <p:nvPicPr>
+          <p:cNvPr id="5" name="Picture 4">
+            <a:extLst>
+              <a:ext uri="{FF2B5EF4-FFF2-40B4-BE49-F238E27FC236}">
+                <a16:creationId xmlns:a16="http://schemas.microsoft.com/office/drawing/2014/main" id="{577A3977-0B93-9F5C-6FEE-047859F35B5D}"/>
+              </a:ext>
+            </a:extLst>
+          </p:cNvPr>
+          <p:cNvPicPr>
+            <a:picLocks noChangeAspect="1"/>
+          </p:cNvPicPr>
+          <p:nvPr/>
+        </p:nvPicPr>
+        <p:blipFill>
+          <a:blip r:embed="rId2"/>
+          <a:stretch>
+            <a:fillRect/>
+          </a:stretch>
+        </p:blipFill>
+        <p:spPr>
+          <a:xfrm>
+            <a:off x="1562582" y="2154730"/>
+            <a:ext cx="11647070" cy="2548540"/>
+          </a:xfrm>
+          <a:prstGeom prst="rect">
+            <a:avLst/>
+          </a:prstGeom>
+          <a:ln>
+            <a:noFill/>
+          </a:ln>
+          <a:effectLst>
+            <a:reflection blurRad="12700" stA="30000" endPos="30000" dist="5000" dir="5400000" sy="-100000" algn="bl" rotWithShape="0"/>
+          </a:effectLst>
+          <a:scene3d>
+            <a:camera prst="perspectiveContrastingLeftFacing">
+              <a:rot lat="300000" lon="19800000" rev="0"/>
+            </a:camera>
+            <a:lightRig rig="threePt" dir="t">
+              <a:rot lat="0" lon="0" rev="2700000"/>
+            </a:lightRig>
+          </a:scene3d>
+          <a:sp3d>
+            <a:bevelT w="63500" h="50800"/>
+          </a:sp3d>
+        </p:spPr>
+      </p:pic>
+    </p:spTree>
+    <p:extLst>
+      <p:ext uri="{BB962C8B-B14F-4D97-AF65-F5344CB8AC3E}">
+        <p14:creationId xmlns:p14="http://schemas.microsoft.com/office/powerpoint/2010/main" val="2118493357"/>
+      </p:ext>
+    </p:extLst>
+  </p:cSld>
+  <p:clrMapOvr>
+    <a:masterClrMapping/>
+  </p:clrMapOvr>
+</p:sld>
+</file>
+
+<file path=ppt/slides/slide4.xml><?xml version="1.0" encoding="utf-8"?>
 <p:sld xmlns:a="http://schemas.openxmlformats.org/drawingml/2006/main" xmlns:r="http://schemas.openxmlformats.org/officeDocument/2006/relationships" xmlns:p="http://schemas.openxmlformats.org/presentationml/2006/main">
   <p:cSld>
     <p:spTree>
@@ -10879,10 +10927,466 @@
   <p:clrMapOvr>
     <a:masterClrMapping/>
   </p:clrMapOvr>
+  <p:timing>
+    <p:tnLst>
+      <p:par>
+        <p:cTn id="1" dur="indefinite" restart="never" nodeType="tmRoot">
+          <p:childTnLst>
+            <p:seq concurrent="1" nextAc="seek">
+              <p:cTn id="2" dur="indefinite" nodeType="mainSeq">
+                <p:childTnLst>
+                  <p:par>
+                    <p:cTn id="3" fill="hold">
+                      <p:stCondLst>
+                        <p:cond delay="indefinite"/>
+                      </p:stCondLst>
+                      <p:childTnLst>
+                        <p:par>
+                          <p:cTn id="4" fill="hold">
+                            <p:stCondLst>
+                              <p:cond delay="0"/>
+                            </p:stCondLst>
+                            <p:childTnLst>
+                              <p:par>
+                                <p:cTn id="5" presetID="10" presetClass="entr" presetSubtype="0" fill="hold" grpId="0" nodeType="clickEffect">
+                                  <p:stCondLst>
+                                    <p:cond delay="0"/>
+                                  </p:stCondLst>
+                                  <p:childTnLst>
+                                    <p:set>
+                                      <p:cBhvr>
+                                        <p:cTn id="6" dur="1" fill="hold">
+                                          <p:stCondLst>
+                                            <p:cond delay="0"/>
+                                          </p:stCondLst>
+                                        </p:cTn>
+                                        <p:tgtEl>
+                                          <p:spTgt spid="3">
+                                            <p:txEl>
+                                              <p:pRg st="0" end="0"/>
+                                            </p:txEl>
+                                          </p:spTgt>
+                                        </p:tgtEl>
+                                        <p:attrNameLst>
+                                          <p:attrName>style.visibility</p:attrName>
+                                        </p:attrNameLst>
+                                      </p:cBhvr>
+                                      <p:to>
+                                        <p:strVal val="visible"/>
+                                      </p:to>
+                                    </p:set>
+                                    <p:animEffect transition="in" filter="fade">
+                                      <p:cBhvr>
+                                        <p:cTn id="7" dur="500"/>
+                                        <p:tgtEl>
+                                          <p:spTgt spid="3">
+                                            <p:txEl>
+                                              <p:pRg st="0" end="0"/>
+                                            </p:txEl>
+                                          </p:spTgt>
+                                        </p:tgtEl>
+                                      </p:cBhvr>
+                                    </p:animEffect>
+                                  </p:childTnLst>
+                                </p:cTn>
+                              </p:par>
+                              <p:par>
+                                <p:cTn id="8" presetID="10" presetClass="entr" presetSubtype="0" fill="hold" grpId="0" nodeType="withEffect">
+                                  <p:stCondLst>
+                                    <p:cond delay="0"/>
+                                  </p:stCondLst>
+                                  <p:childTnLst>
+                                    <p:set>
+                                      <p:cBhvr>
+                                        <p:cTn id="9" dur="1" fill="hold">
+                                          <p:stCondLst>
+                                            <p:cond delay="0"/>
+                                          </p:stCondLst>
+                                        </p:cTn>
+                                        <p:tgtEl>
+                                          <p:spTgt spid="3">
+                                            <p:txEl>
+                                              <p:pRg st="1" end="1"/>
+                                            </p:txEl>
+                                          </p:spTgt>
+                                        </p:tgtEl>
+                                        <p:attrNameLst>
+                                          <p:attrName>style.visibility</p:attrName>
+                                        </p:attrNameLst>
+                                      </p:cBhvr>
+                                      <p:to>
+                                        <p:strVal val="visible"/>
+                                      </p:to>
+                                    </p:set>
+                                    <p:animEffect transition="in" filter="fade">
+                                      <p:cBhvr>
+                                        <p:cTn id="10" dur="500"/>
+                                        <p:tgtEl>
+                                          <p:spTgt spid="3">
+                                            <p:txEl>
+                                              <p:pRg st="1" end="1"/>
+                                            </p:txEl>
+                                          </p:spTgt>
+                                        </p:tgtEl>
+                                      </p:cBhvr>
+                                    </p:animEffect>
+                                  </p:childTnLst>
+                                </p:cTn>
+                              </p:par>
+                              <p:par>
+                                <p:cTn id="11" presetID="10" presetClass="entr" presetSubtype="0" fill="hold" grpId="0" nodeType="withEffect">
+                                  <p:stCondLst>
+                                    <p:cond delay="0"/>
+                                  </p:stCondLst>
+                                  <p:childTnLst>
+                                    <p:set>
+                                      <p:cBhvr>
+                                        <p:cTn id="12" dur="1" fill="hold">
+                                          <p:stCondLst>
+                                            <p:cond delay="0"/>
+                                          </p:stCondLst>
+                                        </p:cTn>
+                                        <p:tgtEl>
+                                          <p:spTgt spid="3">
+                                            <p:txEl>
+                                              <p:pRg st="2" end="2"/>
+                                            </p:txEl>
+                                          </p:spTgt>
+                                        </p:tgtEl>
+                                        <p:attrNameLst>
+                                          <p:attrName>style.visibility</p:attrName>
+                                        </p:attrNameLst>
+                                      </p:cBhvr>
+                                      <p:to>
+                                        <p:strVal val="visible"/>
+                                      </p:to>
+                                    </p:set>
+                                    <p:animEffect transition="in" filter="fade">
+                                      <p:cBhvr>
+                                        <p:cTn id="13" dur="500"/>
+                                        <p:tgtEl>
+                                          <p:spTgt spid="3">
+                                            <p:txEl>
+                                              <p:pRg st="2" end="2"/>
+                                            </p:txEl>
+                                          </p:spTgt>
+                                        </p:tgtEl>
+                                      </p:cBhvr>
+                                    </p:animEffect>
+                                  </p:childTnLst>
+                                </p:cTn>
+                              </p:par>
+                              <p:par>
+                                <p:cTn id="14" presetID="10" presetClass="entr" presetSubtype="0" fill="hold" grpId="0" nodeType="withEffect">
+                                  <p:stCondLst>
+                                    <p:cond delay="0"/>
+                                  </p:stCondLst>
+                                  <p:childTnLst>
+                                    <p:set>
+                                      <p:cBhvr>
+                                        <p:cTn id="15" dur="1" fill="hold">
+                                          <p:stCondLst>
+                                            <p:cond delay="0"/>
+                                          </p:stCondLst>
+                                        </p:cTn>
+                                        <p:tgtEl>
+                                          <p:spTgt spid="3">
+                                            <p:txEl>
+                                              <p:pRg st="3" end="3"/>
+                                            </p:txEl>
+                                          </p:spTgt>
+                                        </p:tgtEl>
+                                        <p:attrNameLst>
+                                          <p:attrName>style.visibility</p:attrName>
+                                        </p:attrNameLst>
+                                      </p:cBhvr>
+                                      <p:to>
+                                        <p:strVal val="visible"/>
+                                      </p:to>
+                                    </p:set>
+                                    <p:animEffect transition="in" filter="fade">
+                                      <p:cBhvr>
+                                        <p:cTn id="16" dur="500"/>
+                                        <p:tgtEl>
+                                          <p:spTgt spid="3">
+                                            <p:txEl>
+                                              <p:pRg st="3" end="3"/>
+                                            </p:txEl>
+                                          </p:spTgt>
+                                        </p:tgtEl>
+                                      </p:cBhvr>
+                                    </p:animEffect>
+                                  </p:childTnLst>
+                                </p:cTn>
+                              </p:par>
+                              <p:par>
+                                <p:cTn id="17" presetID="10" presetClass="entr" presetSubtype="0" fill="hold" grpId="0" nodeType="withEffect">
+                                  <p:stCondLst>
+                                    <p:cond delay="0"/>
+                                  </p:stCondLst>
+                                  <p:childTnLst>
+                                    <p:set>
+                                      <p:cBhvr>
+                                        <p:cTn id="18" dur="1" fill="hold">
+                                          <p:stCondLst>
+                                            <p:cond delay="0"/>
+                                          </p:stCondLst>
+                                        </p:cTn>
+                                        <p:tgtEl>
+                                          <p:spTgt spid="3">
+                                            <p:txEl>
+                                              <p:pRg st="4" end="4"/>
+                                            </p:txEl>
+                                          </p:spTgt>
+                                        </p:tgtEl>
+                                        <p:attrNameLst>
+                                          <p:attrName>style.visibility</p:attrName>
+                                        </p:attrNameLst>
+                                      </p:cBhvr>
+                                      <p:to>
+                                        <p:strVal val="visible"/>
+                                      </p:to>
+                                    </p:set>
+                                    <p:animEffect transition="in" filter="fade">
+                                      <p:cBhvr>
+                                        <p:cTn id="19" dur="500"/>
+                                        <p:tgtEl>
+                                          <p:spTgt spid="3">
+                                            <p:txEl>
+                                              <p:pRg st="4" end="4"/>
+                                            </p:txEl>
+                                          </p:spTgt>
+                                        </p:tgtEl>
+                                      </p:cBhvr>
+                                    </p:animEffect>
+                                  </p:childTnLst>
+                                </p:cTn>
+                              </p:par>
+                              <p:par>
+                                <p:cTn id="20" presetID="10" presetClass="entr" presetSubtype="0" fill="hold" grpId="0" nodeType="withEffect">
+                                  <p:stCondLst>
+                                    <p:cond delay="0"/>
+                                  </p:stCondLst>
+                                  <p:childTnLst>
+                                    <p:set>
+                                      <p:cBhvr>
+                                        <p:cTn id="21" dur="1" fill="hold">
+                                          <p:stCondLst>
+                                            <p:cond delay="0"/>
+                                          </p:stCondLst>
+                                        </p:cTn>
+                                        <p:tgtEl>
+                                          <p:spTgt spid="3">
+                                            <p:txEl>
+                                              <p:pRg st="5" end="5"/>
+                                            </p:txEl>
+                                          </p:spTgt>
+                                        </p:tgtEl>
+                                        <p:attrNameLst>
+                                          <p:attrName>style.visibility</p:attrName>
+                                        </p:attrNameLst>
+                                      </p:cBhvr>
+                                      <p:to>
+                                        <p:strVal val="visible"/>
+                                      </p:to>
+                                    </p:set>
+                                    <p:animEffect transition="in" filter="fade">
+                                      <p:cBhvr>
+                                        <p:cTn id="22" dur="500"/>
+                                        <p:tgtEl>
+                                          <p:spTgt spid="3">
+                                            <p:txEl>
+                                              <p:pRg st="5" end="5"/>
+                                            </p:txEl>
+                                          </p:spTgt>
+                                        </p:tgtEl>
+                                      </p:cBhvr>
+                                    </p:animEffect>
+                                  </p:childTnLst>
+                                </p:cTn>
+                              </p:par>
+                            </p:childTnLst>
+                          </p:cTn>
+                        </p:par>
+                      </p:childTnLst>
+                    </p:cTn>
+                  </p:par>
+                  <p:par>
+                    <p:cTn id="23" fill="hold">
+                      <p:stCondLst>
+                        <p:cond delay="indefinite"/>
+                      </p:stCondLst>
+                      <p:childTnLst>
+                        <p:par>
+                          <p:cTn id="24" fill="hold">
+                            <p:stCondLst>
+                              <p:cond delay="0"/>
+                            </p:stCondLst>
+                            <p:childTnLst>
+                              <p:par>
+                                <p:cTn id="25" presetID="10" presetClass="entr" presetSubtype="0" fill="hold" grpId="0" nodeType="clickEffect">
+                                  <p:stCondLst>
+                                    <p:cond delay="0"/>
+                                  </p:stCondLst>
+                                  <p:childTnLst>
+                                    <p:set>
+                                      <p:cBhvr>
+                                        <p:cTn id="26" dur="1" fill="hold">
+                                          <p:stCondLst>
+                                            <p:cond delay="0"/>
+                                          </p:stCondLst>
+                                        </p:cTn>
+                                        <p:tgtEl>
+                                          <p:spTgt spid="3">
+                                            <p:txEl>
+                                              <p:pRg st="6" end="6"/>
+                                            </p:txEl>
+                                          </p:spTgt>
+                                        </p:tgtEl>
+                                        <p:attrNameLst>
+                                          <p:attrName>style.visibility</p:attrName>
+                                        </p:attrNameLst>
+                                      </p:cBhvr>
+                                      <p:to>
+                                        <p:strVal val="visible"/>
+                                      </p:to>
+                                    </p:set>
+                                    <p:animEffect transition="in" filter="fade">
+                                      <p:cBhvr>
+                                        <p:cTn id="27" dur="500"/>
+                                        <p:tgtEl>
+                                          <p:spTgt spid="3">
+                                            <p:txEl>
+                                              <p:pRg st="6" end="6"/>
+                                            </p:txEl>
+                                          </p:spTgt>
+                                        </p:tgtEl>
+                                      </p:cBhvr>
+                                    </p:animEffect>
+                                  </p:childTnLst>
+                                </p:cTn>
+                              </p:par>
+                              <p:par>
+                                <p:cTn id="28" presetID="10" presetClass="entr" presetSubtype="0" fill="hold" grpId="0" nodeType="withEffect">
+                                  <p:stCondLst>
+                                    <p:cond delay="0"/>
+                                  </p:stCondLst>
+                                  <p:childTnLst>
+                                    <p:set>
+                                      <p:cBhvr>
+                                        <p:cTn id="29" dur="1" fill="hold">
+                                          <p:stCondLst>
+                                            <p:cond delay="0"/>
+                                          </p:stCondLst>
+                                        </p:cTn>
+                                        <p:tgtEl>
+                                          <p:spTgt spid="3">
+                                            <p:txEl>
+                                              <p:pRg st="7" end="7"/>
+                                            </p:txEl>
+                                          </p:spTgt>
+                                        </p:tgtEl>
+                                        <p:attrNameLst>
+                                          <p:attrName>style.visibility</p:attrName>
+                                        </p:attrNameLst>
+                                      </p:cBhvr>
+                                      <p:to>
+                                        <p:strVal val="visible"/>
+                                      </p:to>
+                                    </p:set>
+                                    <p:animEffect transition="in" filter="fade">
+                                      <p:cBhvr>
+                                        <p:cTn id="30" dur="500"/>
+                                        <p:tgtEl>
+                                          <p:spTgt spid="3">
+                                            <p:txEl>
+                                              <p:pRg st="7" end="7"/>
+                                            </p:txEl>
+                                          </p:spTgt>
+                                        </p:tgtEl>
+                                      </p:cBhvr>
+                                    </p:animEffect>
+                                  </p:childTnLst>
+                                </p:cTn>
+                              </p:par>
+                              <p:par>
+                                <p:cTn id="31" presetID="10" presetClass="entr" presetSubtype="0" fill="hold" grpId="0" nodeType="withEffect">
+                                  <p:stCondLst>
+                                    <p:cond delay="0"/>
+                                  </p:stCondLst>
+                                  <p:childTnLst>
+                                    <p:set>
+                                      <p:cBhvr>
+                                        <p:cTn id="32" dur="1" fill="hold">
+                                          <p:stCondLst>
+                                            <p:cond delay="0"/>
+                                          </p:stCondLst>
+                                        </p:cTn>
+                                        <p:tgtEl>
+                                          <p:spTgt spid="3">
+                                            <p:txEl>
+                                              <p:pRg st="8" end="8"/>
+                                            </p:txEl>
+                                          </p:spTgt>
+                                        </p:tgtEl>
+                                        <p:attrNameLst>
+                                          <p:attrName>style.visibility</p:attrName>
+                                        </p:attrNameLst>
+                                      </p:cBhvr>
+                                      <p:to>
+                                        <p:strVal val="visible"/>
+                                      </p:to>
+                                    </p:set>
+                                    <p:animEffect transition="in" filter="fade">
+                                      <p:cBhvr>
+                                        <p:cTn id="33" dur="500"/>
+                                        <p:tgtEl>
+                                          <p:spTgt spid="3">
+                                            <p:txEl>
+                                              <p:pRg st="8" end="8"/>
+                                            </p:txEl>
+                                          </p:spTgt>
+                                        </p:tgtEl>
+                                      </p:cBhvr>
+                                    </p:animEffect>
+                                  </p:childTnLst>
+                                </p:cTn>
+                              </p:par>
+                            </p:childTnLst>
+                          </p:cTn>
+                        </p:par>
+                      </p:childTnLst>
+                    </p:cTn>
+                  </p:par>
+                </p:childTnLst>
+              </p:cTn>
+              <p:prevCondLst>
+                <p:cond evt="onPrev" delay="0">
+                  <p:tgtEl>
+                    <p:sldTgt/>
+                  </p:tgtEl>
+                </p:cond>
+              </p:prevCondLst>
+              <p:nextCondLst>
+                <p:cond evt="onNext" delay="0">
+                  <p:tgtEl>
+                    <p:sldTgt/>
+                  </p:tgtEl>
+                </p:cond>
+              </p:nextCondLst>
+            </p:seq>
+          </p:childTnLst>
+        </p:cTn>
+      </p:par>
+    </p:tnLst>
+    <p:bldLst>
+      <p:bldP spid="3" grpId="0" build="p"/>
+    </p:bldLst>
+  </p:timing>
 </p:sld>
 </file>
 
-<file path=ppt/slides/slide4.xml><?xml version="1.0" encoding="utf-8"?>
+<file path=ppt/slides/slide5.xml><?xml version="1.0" encoding="utf-8"?>
 <p:sld xmlns:a="http://schemas.openxmlformats.org/drawingml/2006/main" xmlns:r="http://schemas.openxmlformats.org/officeDocument/2006/relationships" xmlns:p="http://schemas.openxmlformats.org/presentationml/2006/main" showMasterSp="0">
   <p:cSld>
     <p:spTree>
@@ -11080,7 +11584,7 @@
 </p:sld>
 </file>
 
-<file path=ppt/slides/slide5.xml><?xml version="1.0" encoding="utf-8"?>
+<file path=ppt/slides/slide6.xml><?xml version="1.0" encoding="utf-8"?>
 <p:sld xmlns:a="http://schemas.openxmlformats.org/drawingml/2006/main" xmlns:r="http://schemas.openxmlformats.org/officeDocument/2006/relationships" xmlns:p="http://schemas.openxmlformats.org/presentationml/2006/main">
   <p:cSld>
     <p:spTree>
@@ -11198,7 +11702,7 @@
 </p:sld>
 </file>
 
-<file path=ppt/slides/slide6.xml><?xml version="1.0" encoding="utf-8"?>
+<file path=ppt/slides/slide7.xml><?xml version="1.0" encoding="utf-8"?>
 <p:sld xmlns:a="http://schemas.openxmlformats.org/drawingml/2006/main" xmlns:r="http://schemas.openxmlformats.org/officeDocument/2006/relationships" xmlns:p="http://schemas.openxmlformats.org/presentationml/2006/main">
   <p:cSld>
     <p:spTree>
@@ -11235,12 +11739,8 @@
           <a:lstStyle/>
           <a:p>
             <a:r>
-              <a:rPr lang="en-US" dirty="0" err="1"/>
-              <a:t>Secredoku</a:t>
-            </a:r>
-            <a:r>
               <a:rPr lang="en-US" dirty="0"/>
-              <a:t>: Secret + Sudoku</a:t>
+              <a:t>Music</a:t>
             </a:r>
             <a:endParaRPr dirty="0"/>
           </a:p>
@@ -11257,6 +11757,10 @@
           </p:nvPr>
         </p:nvSpPr>
         <p:spPr>
+          <a:xfrm>
+            <a:off x="976313" y="1946672"/>
+            <a:ext cx="10599602" cy="4018359"/>
+          </a:xfrm>
           <a:prstGeom prst="rect">
             <a:avLst/>
           </a:prstGeom>
@@ -11279,26 +11783,7 @@
             </a:r>
             <a:r>
               <a:rPr lang="en-CA" b="0" dirty="0"/>
-              <a:t>Ultimately, c</a:t>
-            </a:r>
-            <a:r>
-              <a:rPr b="0" dirty="0" err="1"/>
-              <a:t>reate</a:t>
-            </a:r>
-            <a:r>
-              <a:rPr b="0" dirty="0"/>
-              <a:t> a planning model that </a:t>
-            </a:r>
-            <a:r>
-              <a:rPr lang="en-US" b="0" dirty="0"/>
-              <a:t>lets an agent</a:t>
-            </a:r>
-            <a:br>
-              <a:rPr lang="en-US" b="0" dirty="0"/>
-            </a:br>
-            <a:r>
-              <a:rPr lang="en-US" b="0" dirty="0"/>
-              <a:t>	walk around a sudoku board and make inferences</a:t>
+              <a:t>We’ll be creating a domain where plans correspond to melodies</a:t>
             </a:r>
             <a:br>
               <a:rPr lang="en-US" b="0" dirty="0"/>
@@ -11330,7 +11815,7 @@
                   <a:schemeClr val="accent3"/>
                 </a:solidFill>
               </a:rPr>
-              <a:t>num</a:t>
+              <a:t>pitch</a:t>
             </a:r>
             <a:r>
               <a:rPr lang="en-CA" b="0" dirty="0"/>
@@ -11342,7 +11827,19 @@
                   <a:schemeClr val="accent3"/>
                 </a:solidFill>
               </a:rPr>
-              <a:t>loc</a:t>
+              <a:t>length</a:t>
+            </a:r>
+            <a:r>
+              <a:rPr lang="en-CA" b="0" dirty="0"/>
+              <a:t>, </a:t>
+            </a:r>
+            <a:r>
+              <a:rPr lang="en-CA" b="0" dirty="0">
+                <a:solidFill>
+                  <a:schemeClr val="accent3"/>
+                </a:solidFill>
+              </a:rPr>
+              <a:t>chord</a:t>
             </a:r>
             <a:endParaRPr lang="fr-FR" dirty="0">
               <a:solidFill>
@@ -11366,12 +11863,24 @@
               <a:t>: </a:t>
             </a:r>
             <a:r>
+              <a:rPr lang="fr-FR" b="0" dirty="0">
+                <a:solidFill>
+                  <a:schemeClr val="accent2"/>
+                </a:solidFill>
+              </a:rPr>
+              <a:t>note-in</a:t>
+            </a:r>
+            <a:r>
+              <a:rPr lang="fr-FR" b="0" dirty="0"/>
+              <a:t>, </a:t>
+            </a:r>
+            <a:r>
               <a:rPr lang="fr-FR" b="0" dirty="0" err="1">
                 <a:solidFill>
                   <a:schemeClr val="accent2"/>
                 </a:solidFill>
               </a:rPr>
-              <a:t>solved</a:t>
+              <a:t>current-chord</a:t>
             </a:r>
             <a:r>
               <a:rPr lang="fr-FR" b="0" dirty="0"/>
@@ -11383,11 +11892,7 @@
                   <a:schemeClr val="accent2"/>
                 </a:solidFill>
               </a:rPr>
-              <a:t>assigned</a:t>
-            </a:r>
-            <a:r>
-              <a:rPr lang="fr-FR" b="0" dirty="0"/>
-              <a:t>, </a:t>
+              <a:t>chord</a:t>
             </a:r>
             <a:r>
               <a:rPr lang="fr-FR" b="0" dirty="0">
@@ -11395,19 +11900,7 @@
                   <a:schemeClr val="accent2"/>
                 </a:solidFill>
               </a:rPr>
-              <a:t>at</a:t>
-            </a:r>
-            <a:r>
-              <a:rPr lang="fr-FR" b="0" dirty="0"/>
-              <a:t>, </a:t>
-            </a:r>
-            <a:r>
-              <a:rPr lang="fr-FR" b="0" dirty="0" err="1">
-                <a:solidFill>
-                  <a:schemeClr val="accent2"/>
-                </a:solidFill>
-              </a:rPr>
-              <a:t>link</a:t>
+              <a:t>-change</a:t>
             </a:r>
             <a:r>
               <a:rPr lang="fr-FR" b="0" dirty="0"/>
@@ -11435,6 +11928,83 @@
               <a:defRPr b="1"/>
             </a:pPr>
             <a:r>
+              <a:rPr lang="en-CA" dirty="0"/>
+              <a:t>Functions: </a:t>
+            </a:r>
+            <a:r>
+              <a:rPr lang="fr-FR" b="0" dirty="0">
+                <a:solidFill>
+                  <a:schemeClr val="accent1"/>
+                </a:solidFill>
+              </a:rPr>
+              <a:t>note-</a:t>
+            </a:r>
+            <a:r>
+              <a:rPr lang="fr-FR" b="0" dirty="0" err="1">
+                <a:solidFill>
+                  <a:schemeClr val="accent1"/>
+                </a:solidFill>
+              </a:rPr>
+              <a:t>length</a:t>
+            </a:r>
+            <a:r>
+              <a:rPr lang="fr-FR" b="0" dirty="0"/>
+              <a:t>, </a:t>
+            </a:r>
+            <a:r>
+              <a:rPr lang="fr-FR" b="0" dirty="0" err="1">
+                <a:solidFill>
+                  <a:schemeClr val="accent1"/>
+                </a:solidFill>
+              </a:rPr>
+              <a:t>chord</a:t>
+            </a:r>
+            <a:r>
+              <a:rPr lang="fr-FR" b="0" dirty="0">
+                <a:solidFill>
+                  <a:schemeClr val="accent1"/>
+                </a:solidFill>
+              </a:rPr>
+              <a:t>-count</a:t>
+            </a:r>
+            <a:r>
+              <a:rPr lang="fr-FR" b="0" dirty="0"/>
+              <a:t>, </a:t>
+            </a:r>
+            <a:r>
+              <a:rPr lang="fr-FR" b="0" dirty="0">
+                <a:solidFill>
+                  <a:schemeClr val="accent1"/>
+                </a:solidFill>
+              </a:rPr>
+              <a:t>max-note-count</a:t>
+            </a:r>
+            <a:r>
+              <a:rPr lang="fr-FR" b="0" dirty="0"/>
+              <a:t>, </a:t>
+            </a:r>
+            <a:r>
+              <a:rPr lang="fr-FR" b="0" dirty="0">
+                <a:solidFill>
+                  <a:schemeClr val="accent1"/>
+                </a:solidFill>
+              </a:rPr>
+              <a:t>…</a:t>
+            </a:r>
+            <a:endParaRPr lang="en-CA" dirty="0">
+              <a:solidFill>
+                <a:schemeClr val="accent1"/>
+              </a:solidFill>
+            </a:endParaRPr>
+          </a:p>
+          <a:p>
+            <a:pPr>
+              <a:buBlip>
+                <a:blip r:embed="rId2"/>
+              </a:buBlip>
+              <a:defRPr b="1"/>
+            </a:pPr>
+            <a:r>
               <a:rPr dirty="0"/>
               <a:t>Actions</a:t>
             </a:r>
@@ -11448,7 +12018,7 @@
                   <a:schemeClr val="accent4"/>
                 </a:solidFill>
               </a:rPr>
-              <a:t>check</a:t>
+              <a:t>play-note</a:t>
             </a:r>
             <a:r>
               <a:rPr b="0" dirty="0"/>
@@ -11460,7 +12030,7 @@
                   <a:schemeClr val="accent4"/>
                 </a:solidFill>
               </a:rPr>
-              <a:t>solve</a:t>
+              <a:t>play-chord</a:t>
             </a:r>
             <a:r>
               <a:rPr lang="en-CA" b="0" dirty="0"/>
@@ -11472,23 +12042,15 @@
                   <a:schemeClr val="accent4"/>
                 </a:solidFill>
               </a:rPr>
-              <a:t>move</a:t>
+              <a:t>progress</a:t>
             </a:r>
             <a:r>
               <a:rPr b="0" dirty="0"/>
-              <a:t>, </a:t>
-            </a:r>
-            <a:r>
-              <a:rPr lang="en-US" b="0" dirty="0">
-                <a:solidFill>
-                  <a:schemeClr val="accent4"/>
-                </a:solidFill>
-              </a:rPr>
-              <a:t>teleport</a:t>
+              <a:t>,</a:t>
             </a:r>
             <a:r>
               <a:rPr lang="en-CA" b="0" dirty="0"/>
-              <a:t>, </a:t>
+              <a:t> </a:t>
             </a:r>
             <a:r>
               <a:rPr lang="en-CA" dirty="0">
@@ -11521,7 +12083,7 @@
             </a:r>
             <a:r>
               <a:rPr lang="en-US" b="0" dirty="0"/>
-              <a:t>Rules of Sudoku + partial info</a:t>
+              <a:t>General guidance for interesting melodies</a:t>
             </a:r>
             <a:endParaRPr b="0" dirty="0"/>
           </a:p>
@@ -11536,7 +12098,7 @@
 </p:sld>
 </file>
 
-<file path=ppt/slides/slide7.xml><?xml version="1.0" encoding="utf-8"?>
+<file path=ppt/slides/slide8.xml><?xml version="1.0" encoding="utf-8"?>
 <p:sld xmlns:a="http://schemas.openxmlformats.org/drawingml/2006/main" xmlns:r="http://schemas.openxmlformats.org/officeDocument/2006/relationships" xmlns:p="http://schemas.openxmlformats.org/presentationml/2006/main">
   <p:cSld>
     <p:spTree>
@@ -11599,7 +12161,9 @@
         </p:nvSpPr>
         <p:spPr/>
         <p:txBody>
-          <a:bodyPr/>
+          <a:bodyPr>
+            <a:normAutofit/>
+          </a:bodyPr>
           <a:lstStyle/>
           <a:p>
             <a:pPr marL="0" indent="0">
@@ -11607,7 +12171,15 @@
             </a:pPr>
             <a:r>
               <a:rPr lang="en-CA" dirty="0" err="1"/>
-              <a:t>poprp</a:t>
+              <a:t>popf</a:t>
+            </a:r>
+            <a:r>
+              <a:rPr lang="en-CA" dirty="0"/>
+              <a:t> -T </a:t>
+            </a:r>
+            <a:r>
+              <a:rPr lang="en-CA" dirty="0" err="1"/>
+              <a:t>domain.pddl</a:t>
             </a:r>
             <a:r>
               <a:rPr lang="en-CA" dirty="0"/>
@@ -11615,47 +12187,9 @@
             </a:r>
             <a:r>
               <a:rPr lang="en-CA" dirty="0" err="1"/>
-              <a:t>domain.pddl</a:t>
-            </a:r>
-            <a:r>
-              <a:rPr lang="en-CA" dirty="0"/>
-              <a:t> </a:t>
-            </a:r>
-            <a:r>
-              <a:rPr lang="en-CA" dirty="0" err="1"/>
               <a:t>problem.pddl</a:t>
             </a:r>
             <a:endParaRPr lang="en-CA" dirty="0"/>
-          </a:p>
-          <a:p>
-            <a:pPr marL="0" indent="0">
-              <a:buNone/>
-            </a:pPr>
-            <a:r>
-              <a:rPr lang="en-CA" dirty="0" err="1"/>
-              <a:t>chmod</a:t>
-            </a:r>
-            <a:r>
-              <a:rPr lang="en-CA" dirty="0"/>
-              <a:t> </a:t>
-            </a:r>
-            <a:r>
-              <a:rPr lang="en-CA" dirty="0" err="1"/>
-              <a:t>a+x</a:t>
-            </a:r>
-            <a:r>
-              <a:rPr lang="en-CA" dirty="0"/>
-              <a:t> compile_plan.sh</a:t>
-            </a:r>
-          </a:p>
-          <a:p>
-            <a:pPr marL="0" indent="0">
-              <a:buNone/>
-            </a:pPr>
-            <a:r>
-              <a:rPr lang="en-CA" dirty="0"/>
-              <a:t>./compile_plan.sh</a:t>
-            </a:r>
           </a:p>
           <a:p>
             <a:pPr marL="0" indent="0">
@@ -11668,8 +12202,12 @@
               <a:buNone/>
             </a:pPr>
             <a:r>
+              <a:rPr lang="en-CA" dirty="0"/>
+              <a:t>optic -T -N </a:t>
+            </a:r>
+            <a:r>
               <a:rPr lang="en-CA" dirty="0" err="1"/>
-              <a:t>cpor</a:t>
+              <a:t>domain.pddl</a:t>
             </a:r>
             <a:r>
               <a:rPr lang="en-CA" dirty="0"/>
@@ -11677,222 +12215,42 @@
             </a:r>
             <a:r>
               <a:rPr lang="en-CA" dirty="0" err="1"/>
-              <a:t>domain.pddl</a:t>
-            </a:r>
-            <a:r>
-              <a:rPr lang="en-CA" dirty="0"/>
-              <a:t> </a:t>
-            </a:r>
-            <a:r>
-              <a:rPr lang="en-CA" dirty="0" err="1"/>
               <a:t>problem.pddl</a:t>
             </a:r>
-            <a:r>
-              <a:rPr lang="en-CA" dirty="0"/>
-              <a:t> offline</a:t>
-            </a:r>
+            <a:endParaRPr lang="en-CA" dirty="0"/>
           </a:p>
           <a:p>
             <a:pPr marL="0" indent="0">
               <a:buNone/>
             </a:pPr>
+            <a:endParaRPr lang="en-CA" dirty="0"/>
+          </a:p>
+          <a:p>
+            <a:pPr marL="0" indent="0">
+              <a:buNone/>
+            </a:pPr>
             <a:r>
               <a:rPr lang="en-CA" dirty="0"/>
-              <a:t>dot -</a:t>
-            </a:r>
-            <a:r>
-              <a:rPr lang="en-CA" dirty="0" err="1"/>
-              <a:t>Tpng</a:t>
-            </a:r>
+              <a:t>&lt;copy + paste plan to problem.*.plan&gt;</a:t>
+            </a:r>
+          </a:p>
+          <a:p>
+            <a:pPr marL="0" indent="0">
+              <a:buNone/>
+            </a:pPr>
+            <a:endParaRPr lang="en-CA" dirty="0"/>
+          </a:p>
+          <a:p>
+            <a:pPr marL="0" indent="0">
+              <a:buNone/>
+            </a:pPr>
             <a:r>
               <a:rPr lang="en-CA" dirty="0"/>
-              <a:t> offline &gt; graph.png</a:t>
+              <a:t>make-music problem.*.plan</a:t>
             </a:r>
           </a:p>
         </p:txBody>
       </p:sp>
-      <p:sp>
-        <p:nvSpPr>
-          <p:cNvPr id="4" name="Rectangle 3">
-            <a:extLst>
-              <a:ext uri="{FF2B5EF4-FFF2-40B4-BE49-F238E27FC236}">
-                <a16:creationId xmlns:a16="http://schemas.microsoft.com/office/drawing/2014/main" id="{B0761746-A076-4EF1-43FD-BA1CAF2830C0}"/>
-              </a:ext>
-            </a:extLst>
-          </p:cNvPr>
-          <p:cNvSpPr/>
-          <p:nvPr/>
-        </p:nvSpPr>
-        <p:spPr>
-          <a:xfrm>
-            <a:off x="8307422" y="3000983"/>
-            <a:ext cx="1926076" cy="856034"/>
-          </a:xfrm>
-          <a:prstGeom prst="rect">
-            <a:avLst/>
-          </a:prstGeom>
-          <a:noFill/>
-          <a:ln w="57150" cap="flat" cmpd="sng" algn="ctr">
-            <a:solidFill>
-              <a:schemeClr val="accent1"/>
-            </a:solidFill>
-            <a:prstDash val="solid"/>
-            <a:round/>
-            <a:headEnd type="none" w="med" len="med"/>
-            <a:tailEnd type="none" w="med" len="med"/>
-          </a:ln>
-        </p:spPr>
-        <p:style>
-          <a:lnRef idx="0">
-            <a:scrgbClr r="0" g="0" b="0"/>
-          </a:lnRef>
-          <a:fillRef idx="0">
-            <a:scrgbClr r="0" g="0" b="0"/>
-          </a:fillRef>
-          <a:effectRef idx="0">
-            <a:scrgbClr r="0" g="0" b="0"/>
-          </a:effectRef>
-          <a:fontRef idx="minor">
-            <a:schemeClr val="accent1"/>
-          </a:fontRef>
-        </p:style>
-        <p:txBody>
-          <a:bodyPr rtlCol="0" anchor="ctr"/>
-          <a:lstStyle/>
-          <a:p>
-            <a:pPr algn="ctr"/>
-            <a:r>
-              <a:rPr lang="en-CA" b="1" dirty="0"/>
-              <a:t>Visualization</a:t>
-            </a:r>
-          </a:p>
-        </p:txBody>
-      </p:sp>
-      <p:cxnSp>
-        <p:nvCxnSpPr>
-          <p:cNvPr id="6" name="Connector: Curved 5">
-            <a:extLst>
-              <a:ext uri="{FF2B5EF4-FFF2-40B4-BE49-F238E27FC236}">
-                <a16:creationId xmlns:a16="http://schemas.microsoft.com/office/drawing/2014/main" id="{8E58AFA5-3B0F-24D8-4DBD-869DBDBB1C92}"/>
-              </a:ext>
-            </a:extLst>
-          </p:cNvPr>
-          <p:cNvCxnSpPr>
-            <a:stCxn id="4" idx="1"/>
-          </p:cNvCxnSpPr>
-          <p:nvPr/>
-        </p:nvCxnSpPr>
-        <p:spPr>
-          <a:xfrm rot="10800000">
-            <a:off x="5408580" y="2694562"/>
-            <a:ext cx="2898843" cy="734438"/>
-          </a:xfrm>
-          <a:prstGeom prst="curvedConnector3">
-            <a:avLst/>
-          </a:prstGeom>
-          <a:ln w="38100">
-            <a:tailEnd type="triangle"/>
-          </a:ln>
-        </p:spPr>
-        <p:style>
-          <a:lnRef idx="1">
-            <a:schemeClr val="accent1"/>
-          </a:lnRef>
-          <a:fillRef idx="0">
-            <a:schemeClr val="accent1"/>
-          </a:fillRef>
-          <a:effectRef idx="0">
-            <a:schemeClr val="accent1"/>
-          </a:effectRef>
-          <a:fontRef idx="minor">
-            <a:schemeClr val="tx1"/>
-          </a:fontRef>
-        </p:style>
-      </p:cxnSp>
-      <p:cxnSp>
-        <p:nvCxnSpPr>
-          <p:cNvPr id="7" name="Connector: Curved 6">
-            <a:extLst>
-              <a:ext uri="{FF2B5EF4-FFF2-40B4-BE49-F238E27FC236}">
-                <a16:creationId xmlns:a16="http://schemas.microsoft.com/office/drawing/2014/main" id="{2BA2FB49-01C8-6672-2D48-CF4A08605F25}"/>
-              </a:ext>
-            </a:extLst>
-          </p:cNvPr>
-          <p:cNvCxnSpPr>
-            <a:cxnSpLocks/>
-            <a:stCxn id="4" idx="1"/>
-          </p:cNvCxnSpPr>
-          <p:nvPr/>
-        </p:nvCxnSpPr>
-        <p:spPr>
-          <a:xfrm rot="10800000">
-            <a:off x="5311302" y="3200400"/>
-            <a:ext cx="2996120" cy="228600"/>
-          </a:xfrm>
-          <a:prstGeom prst="curvedConnector3">
-            <a:avLst/>
-          </a:prstGeom>
-          <a:ln w="38100">
-            <a:tailEnd type="triangle"/>
-          </a:ln>
-        </p:spPr>
-        <p:style>
-          <a:lnRef idx="1">
-            <a:schemeClr val="accent1"/>
-          </a:lnRef>
-          <a:fillRef idx="0">
-            <a:schemeClr val="accent1"/>
-          </a:fillRef>
-          <a:effectRef idx="0">
-            <a:schemeClr val="accent1"/>
-          </a:effectRef>
-          <a:fontRef idx="minor">
-            <a:schemeClr val="tx1"/>
-          </a:fontRef>
-        </p:style>
-      </p:cxnSp>
-      <p:cxnSp>
-        <p:nvCxnSpPr>
-          <p:cNvPr id="8" name="Connector: Curved 7">
-            <a:extLst>
-              <a:ext uri="{FF2B5EF4-FFF2-40B4-BE49-F238E27FC236}">
-                <a16:creationId xmlns:a16="http://schemas.microsoft.com/office/drawing/2014/main" id="{8419EED3-39E0-4C08-2254-5FF9F521088D}"/>
-              </a:ext>
-            </a:extLst>
-          </p:cNvPr>
-          <p:cNvCxnSpPr>
-            <a:cxnSpLocks/>
-            <a:stCxn id="4" idx="1"/>
-          </p:cNvCxnSpPr>
-          <p:nvPr/>
-        </p:nvCxnSpPr>
-        <p:spPr>
-          <a:xfrm rot="10800000" flipV="1">
-            <a:off x="5758774" y="3428999"/>
-            <a:ext cx="2548648" cy="1386191"/>
-          </a:xfrm>
-          <a:prstGeom prst="curvedConnector3">
-            <a:avLst/>
-          </a:prstGeom>
-          <a:ln w="38100">
-            <a:tailEnd type="triangle"/>
-          </a:ln>
-        </p:spPr>
-        <p:style>
-          <a:lnRef idx="1">
-            <a:schemeClr val="accent1"/>
-          </a:lnRef>
-          <a:fillRef idx="0">
-            <a:schemeClr val="accent1"/>
-          </a:fillRef>
-          <a:effectRef idx="0">
-            <a:schemeClr val="accent1"/>
-          </a:effectRef>
-          <a:fontRef idx="minor">
-            <a:schemeClr val="tx1"/>
-          </a:fontRef>
-        </p:style>
-      </p:cxnSp>
     </p:spTree>
     <p:extLst>
       <p:ext uri="{BB962C8B-B14F-4D97-AF65-F5344CB8AC3E}">
@@ -11925,7 +12283,7 @@
                             </p:stCondLst>
                             <p:childTnLst>
                               <p:par>
-                                <p:cTn id="5" presetID="10" presetClass="entr" presetSubtype="0" fill="hold" grpId="0" nodeType="clickEffect">
+                                <p:cTn id="5" presetID="10" presetClass="entr" presetSubtype="0" fill="hold" nodeType="clickEffect">
                                   <p:stCondLst>
                                     <p:cond delay="0"/>
                                   </p:stCondLst>
@@ -11938,7 +12296,11 @@
                                           </p:stCondLst>
                                         </p:cTn>
                                         <p:tgtEl>
-                                          <p:spTgt spid="4"/>
+                                          <p:spTgt spid="3">
+                                            <p:txEl>
+                                              <p:pRg st="6" end="6"/>
+                                            </p:txEl>
+                                          </p:spTgt>
                                         </p:tgtEl>
                                         <p:attrNameLst>
                                           <p:attrName>style.visibility</p:attrName>
@@ -11952,139 +12314,11 @@
                                       <p:cBhvr>
                                         <p:cTn id="7" dur="500"/>
                                         <p:tgtEl>
-                                          <p:spTgt spid="4"/>
-                                        </p:tgtEl>
-                                      </p:cBhvr>
-                                    </p:animEffect>
-                                  </p:childTnLst>
-                                </p:cTn>
-                              </p:par>
-                            </p:childTnLst>
-                          </p:cTn>
-                        </p:par>
-                        <p:par>
-                          <p:cTn id="8" fill="hold">
-                            <p:stCondLst>
-                              <p:cond delay="500"/>
-                            </p:stCondLst>
-                            <p:childTnLst>
-                              <p:par>
-                                <p:cTn id="9" presetID="22" presetClass="entr" presetSubtype="2" fill="hold" nodeType="afterEffect">
-                                  <p:stCondLst>
-                                    <p:cond delay="0"/>
-                                  </p:stCondLst>
-                                  <p:childTnLst>
-                                    <p:set>
-                                      <p:cBhvr>
-                                        <p:cTn id="10" dur="1" fill="hold">
-                                          <p:stCondLst>
-                                            <p:cond delay="0"/>
-                                          </p:stCondLst>
-                                        </p:cTn>
-                                        <p:tgtEl>
-                                          <p:spTgt spid="6"/>
-                                        </p:tgtEl>
-                                        <p:attrNameLst>
-                                          <p:attrName>style.visibility</p:attrName>
-                                        </p:attrNameLst>
-                                      </p:cBhvr>
-                                      <p:to>
-                                        <p:strVal val="visible"/>
-                                      </p:to>
-                                    </p:set>
-                                    <p:animEffect transition="in" filter="wipe(right)">
-                                      <p:cBhvr>
-                                        <p:cTn id="11" dur="500"/>
-                                        <p:tgtEl>
-                                          <p:spTgt spid="6"/>
-                                        </p:tgtEl>
-                                      </p:cBhvr>
-                                    </p:animEffect>
-                                  </p:childTnLst>
-                                </p:cTn>
-                              </p:par>
-                            </p:childTnLst>
-                          </p:cTn>
-                        </p:par>
-                        <p:par>
-                          <p:cTn id="12" fill="hold">
-                            <p:stCondLst>
-                              <p:cond delay="1000"/>
-                            </p:stCondLst>
-                            <p:childTnLst>
-                              <p:par>
-                                <p:cTn id="13" presetID="22" presetClass="entr" presetSubtype="2" fill="hold" nodeType="afterEffect">
-                                  <p:stCondLst>
-                                    <p:cond delay="0"/>
-                                  </p:stCondLst>
-                                  <p:childTnLst>
-                                    <p:set>
-                                      <p:cBhvr>
-                                        <p:cTn id="14" dur="1" fill="hold">
-                                          <p:stCondLst>
-                                            <p:cond delay="0"/>
-                                          </p:stCondLst>
-                                        </p:cTn>
-                                        <p:tgtEl>
-                                          <p:spTgt spid="7"/>
-                                        </p:tgtEl>
-                                        <p:attrNameLst>
-                                          <p:attrName>style.visibility</p:attrName>
-                                        </p:attrNameLst>
-                                      </p:cBhvr>
-                                      <p:to>
-                                        <p:strVal val="visible"/>
-                                      </p:to>
-                                    </p:set>
-                                    <p:animEffect transition="in" filter="wipe(right)">
-                                      <p:cBhvr>
-                                        <p:cTn id="15" dur="500"/>
-                                        <p:tgtEl>
-                                          <p:spTgt spid="7"/>
-                                        </p:tgtEl>
-                                      </p:cBhvr>
-                                    </p:animEffect>
-                                  </p:childTnLst>
-                                </p:cTn>
-                              </p:par>
-                            </p:childTnLst>
-                          </p:cTn>
-                        </p:par>
-                        <p:par>
-                          <p:cTn id="16" fill="hold">
-                            <p:stCondLst>
-                              <p:cond delay="1500"/>
-                            </p:stCondLst>
-                            <p:childTnLst>
-                              <p:par>
-                                <p:cTn id="17" presetID="22" presetClass="entr" presetSubtype="2" fill="hold" nodeType="afterEffect">
-                                  <p:stCondLst>
-                                    <p:cond delay="0"/>
-                                  </p:stCondLst>
-                                  <p:childTnLst>
-                                    <p:set>
-                                      <p:cBhvr>
-                                        <p:cTn id="18" dur="1" fill="hold">
-                                          <p:stCondLst>
-                                            <p:cond delay="0"/>
-                                          </p:stCondLst>
-                                        </p:cTn>
-                                        <p:tgtEl>
-                                          <p:spTgt spid="8"/>
-                                        </p:tgtEl>
-                                        <p:attrNameLst>
-                                          <p:attrName>style.visibility</p:attrName>
-                                        </p:attrNameLst>
-                                      </p:cBhvr>
-                                      <p:to>
-                                        <p:strVal val="visible"/>
-                                      </p:to>
-                                    </p:set>
-                                    <p:animEffect transition="in" filter="wipe(right)">
-                                      <p:cBhvr>
-                                        <p:cTn id="19" dur="500"/>
-                                        <p:tgtEl>
-                                          <p:spTgt spid="8"/>
+                                          <p:spTgt spid="3">
+                                            <p:txEl>
+                                              <p:pRg st="6" end="6"/>
+                                            </p:txEl>
+                                          </p:spTgt>
                                         </p:tgtEl>
                                       </p:cBhvr>
                                     </p:animEffect>
@@ -12118,638 +12352,7 @@
         </p:cTn>
       </p:par>
     </p:tnLst>
-    <p:bldLst>
-      <p:bldP spid="4" grpId="0" animBg="1"/>
-    </p:bldLst>
   </p:timing>
-</p:sld>
-</file>
-
-<file path=ppt/slides/slide8.xml><?xml version="1.0" encoding="utf-8"?>
-<p:sld xmlns:a="http://schemas.openxmlformats.org/drawingml/2006/main" xmlns:r="http://schemas.openxmlformats.org/officeDocument/2006/relationships" xmlns:p="http://schemas.openxmlformats.org/presentationml/2006/main" showMasterSp="0">
-  <p:cSld>
-    <p:spTree>
-      <p:nvGrpSpPr>
-        <p:cNvPr id="1" name=""/>
-        <p:cNvGrpSpPr/>
-        <p:nvPr/>
-      </p:nvGrpSpPr>
-      <p:grpSpPr>
-        <a:xfrm>
-          <a:off x="0" y="0"/>
-          <a:ext cx="0" cy="0"/>
-          <a:chOff x="0" y="0"/>
-          <a:chExt cx="0" cy="0"/>
-        </a:xfrm>
-      </p:grpSpPr>
-      <p:sp>
-        <p:nvSpPr>
-          <p:cNvPr id="4" name="Title 3">
-            <a:extLst>
-              <a:ext uri="{FF2B5EF4-FFF2-40B4-BE49-F238E27FC236}">
-                <a16:creationId xmlns:a16="http://schemas.microsoft.com/office/drawing/2014/main" id="{80EAC0C6-7B8A-1444-CF6E-AFD7613F9128}"/>
-              </a:ext>
-            </a:extLst>
-          </p:cNvPr>
-          <p:cNvSpPr>
-            <a:spLocks noGrp="1"/>
-          </p:cNvSpPr>
-          <p:nvPr>
-            <p:ph type="title"/>
-          </p:nvPr>
-        </p:nvSpPr>
-        <p:spPr/>
-        <p:txBody>
-          <a:bodyPr/>
-          <a:lstStyle/>
-          <a:p>
-            <a:r>
-              <a:rPr lang="en-CA" dirty="0"/>
-              <a:t>1. Mini </a:t>
-            </a:r>
-            <a:r>
-              <a:rPr lang="en-CA" dirty="0" err="1"/>
-              <a:t>Secredoku</a:t>
-            </a:r>
-            <a:endParaRPr lang="en-CA" dirty="0"/>
-          </a:p>
-        </p:txBody>
-      </p:sp>
-      <p:sp>
-        <p:nvSpPr>
-          <p:cNvPr id="5" name="Content Placeholder 4">
-            <a:extLst>
-              <a:ext uri="{FF2B5EF4-FFF2-40B4-BE49-F238E27FC236}">
-                <a16:creationId xmlns:a16="http://schemas.microsoft.com/office/drawing/2014/main" id="{916B2140-6178-6477-FAC2-4FC081B9C2C5}"/>
-              </a:ext>
-            </a:extLst>
-          </p:cNvPr>
-          <p:cNvSpPr>
-            <a:spLocks noGrp="1"/>
-          </p:cNvSpPr>
-          <p:nvPr>
-            <p:ph idx="1"/>
-          </p:nvPr>
-        </p:nvSpPr>
-        <p:spPr>
-          <a:xfrm>
-            <a:off x="838200" y="1825625"/>
-            <a:ext cx="10515600" cy="4872058"/>
-          </a:xfrm>
-        </p:spPr>
-        <p:txBody>
-          <a:bodyPr>
-            <a:normAutofit/>
-          </a:bodyPr>
-          <a:lstStyle/>
-          <a:p>
-            <a:pPr marL="0" indent="0">
-              <a:buNone/>
-            </a:pPr>
-            <a:r>
-              <a:rPr lang="en-CA" sz="3200" dirty="0"/>
-              <a:t>Let’s just solve a 2x2 Sudoku</a:t>
-            </a:r>
-          </a:p>
-          <a:p>
-            <a:r>
-              <a:rPr lang="en-CA" dirty="0"/>
-              <a:t>First, look &amp; understand the problem file.</a:t>
-            </a:r>
-            <a:br>
-              <a:rPr lang="en-CA" dirty="0"/>
-            </a:br>
-            <a:endParaRPr lang="en-CA" dirty="0"/>
-          </a:p>
-          <a:p>
-            <a:endParaRPr lang="en-CA" dirty="0"/>
-          </a:p>
-          <a:p>
-            <a:endParaRPr lang="en-CA" dirty="0"/>
-          </a:p>
-          <a:p>
-            <a:endParaRPr lang="en-CA" dirty="0"/>
-          </a:p>
-          <a:p>
-            <a:pPr marL="0" indent="0">
-              <a:buNone/>
-            </a:pPr>
-            <a:br>
-              <a:rPr lang="en-CA" dirty="0"/>
-            </a:br>
-            <a:br>
-              <a:rPr lang="en-CA" dirty="0"/>
-            </a:br>
-            <a:r>
-              <a:rPr lang="en-CA" dirty="0"/>
-              <a:t>      </a:t>
-            </a:r>
-            <a:r>
-              <a:rPr lang="en-CA" sz="2800" dirty="0"/>
-              <a:t>http://editor.planning.domains/planning-course/ppos/mini</a:t>
-            </a:r>
-          </a:p>
-        </p:txBody>
-      </p:sp>
-      <p:sp>
-        <p:nvSpPr>
-          <p:cNvPr id="2" name="Content Placeholder 4">
-            <a:extLst>
-              <a:ext uri="{FF2B5EF4-FFF2-40B4-BE49-F238E27FC236}">
-                <a16:creationId xmlns:a16="http://schemas.microsoft.com/office/drawing/2014/main" id="{F5EFCDB9-F810-594F-651D-92BE45FFF962}"/>
-              </a:ext>
-            </a:extLst>
-          </p:cNvPr>
-          <p:cNvSpPr txBox="1">
-            <a:spLocks/>
-          </p:cNvSpPr>
-          <p:nvPr/>
-        </p:nvSpPr>
-        <p:spPr>
-          <a:xfrm>
-            <a:off x="6846124" y="3251016"/>
-            <a:ext cx="4507676" cy="1632073"/>
-          </a:xfrm>
-          <a:prstGeom prst="rect">
-            <a:avLst/>
-          </a:prstGeom>
-        </p:spPr>
-        <p:txBody>
-          <a:bodyPr vert="horz" lIns="91440" tIns="45720" rIns="91440" bIns="45720" rtlCol="0">
-            <a:normAutofit/>
-          </a:bodyPr>
-          <a:lstStyle>
-            <a:lvl1pPr marL="228600" indent="-228600" algn="l" defTabSz="914400" rtl="0" eaLnBrk="1" latinLnBrk="0" hangingPunct="1">
-              <a:lnSpc>
-                <a:spcPct val="90000"/>
-              </a:lnSpc>
-              <a:spcBef>
-                <a:spcPts val="1000"/>
-              </a:spcBef>
-              <a:buFont typeface="Arial" panose="020B0604020202020204" pitchFamily="34" charset="0"/>
-              <a:buChar char="•"/>
-              <a:defRPr sz="2800" kern="1200">
-                <a:solidFill>
-                  <a:schemeClr val="tx1"/>
-                </a:solidFill>
-                <a:latin typeface="+mn-lt"/>
-                <a:ea typeface="+mn-ea"/>
-                <a:cs typeface="+mn-cs"/>
-              </a:defRPr>
-            </a:lvl1pPr>
-            <a:lvl2pPr marL="685800" indent="-228600" algn="l" defTabSz="914400" rtl="0" eaLnBrk="1" latinLnBrk="0" hangingPunct="1">
-              <a:lnSpc>
-                <a:spcPct val="90000"/>
-              </a:lnSpc>
-              <a:spcBef>
-                <a:spcPts val="500"/>
-              </a:spcBef>
-              <a:buFont typeface="Arial" panose="020B0604020202020204" pitchFamily="34" charset="0"/>
-              <a:buChar char="•"/>
-              <a:defRPr sz="2400" kern="1200">
-                <a:solidFill>
-                  <a:schemeClr val="tx1"/>
-                </a:solidFill>
-                <a:latin typeface="+mn-lt"/>
-                <a:ea typeface="+mn-ea"/>
-                <a:cs typeface="+mn-cs"/>
-              </a:defRPr>
-            </a:lvl2pPr>
-            <a:lvl3pPr marL="1143000" indent="-228600" algn="l" defTabSz="914400" rtl="0" eaLnBrk="1" latinLnBrk="0" hangingPunct="1">
-              <a:lnSpc>
-                <a:spcPct val="90000"/>
-              </a:lnSpc>
-              <a:spcBef>
-                <a:spcPts val="500"/>
-              </a:spcBef>
-              <a:buFont typeface="Arial" panose="020B0604020202020204" pitchFamily="34" charset="0"/>
-              <a:buChar char="•"/>
-              <a:defRPr sz="2000" kern="1200">
-                <a:solidFill>
-                  <a:schemeClr val="tx1"/>
-                </a:solidFill>
-                <a:latin typeface="+mn-lt"/>
-                <a:ea typeface="+mn-ea"/>
-                <a:cs typeface="+mn-cs"/>
-              </a:defRPr>
-            </a:lvl3pPr>
-            <a:lvl4pPr marL="1600200" indent="-228600" algn="l" defTabSz="914400" rtl="0" eaLnBrk="1" latinLnBrk="0" hangingPunct="1">
-              <a:lnSpc>
-                <a:spcPct val="90000"/>
-              </a:lnSpc>
-              <a:spcBef>
-                <a:spcPts val="500"/>
-              </a:spcBef>
-              <a:buFont typeface="Arial" panose="020B0604020202020204" pitchFamily="34" charset="0"/>
-              <a:buChar char="•"/>
-              <a:defRPr sz="1800" kern="1200">
-                <a:solidFill>
-                  <a:schemeClr val="tx1"/>
-                </a:solidFill>
-                <a:latin typeface="+mn-lt"/>
-                <a:ea typeface="+mn-ea"/>
-                <a:cs typeface="+mn-cs"/>
-              </a:defRPr>
-            </a:lvl4pPr>
-            <a:lvl5pPr marL="2057400" indent="-228600" algn="l" defTabSz="914400" rtl="0" eaLnBrk="1" latinLnBrk="0" hangingPunct="1">
-              <a:lnSpc>
-                <a:spcPct val="90000"/>
-              </a:lnSpc>
-              <a:spcBef>
-                <a:spcPts val="500"/>
-              </a:spcBef>
-              <a:buFont typeface="Arial" panose="020B0604020202020204" pitchFamily="34" charset="0"/>
-              <a:buChar char="•"/>
-              <a:defRPr sz="1800" kern="1200">
-                <a:solidFill>
-                  <a:schemeClr val="tx1"/>
-                </a:solidFill>
-                <a:latin typeface="+mn-lt"/>
-                <a:ea typeface="+mn-ea"/>
-                <a:cs typeface="+mn-cs"/>
-              </a:defRPr>
-            </a:lvl5pPr>
-            <a:lvl6pPr marL="2514600" indent="-228600" algn="l" defTabSz="914400" rtl="0" eaLnBrk="1" latinLnBrk="0" hangingPunct="1">
-              <a:lnSpc>
-                <a:spcPct val="90000"/>
-              </a:lnSpc>
-              <a:spcBef>
-                <a:spcPts val="500"/>
-              </a:spcBef>
-              <a:buFont typeface="Arial" panose="020B0604020202020204" pitchFamily="34" charset="0"/>
-              <a:buChar char="•"/>
-              <a:defRPr sz="1800" kern="1200">
-                <a:solidFill>
-                  <a:schemeClr val="tx1"/>
-                </a:solidFill>
-                <a:latin typeface="+mn-lt"/>
-                <a:ea typeface="+mn-ea"/>
-                <a:cs typeface="+mn-cs"/>
-              </a:defRPr>
-            </a:lvl6pPr>
-            <a:lvl7pPr marL="2971800" indent="-228600" algn="l" defTabSz="914400" rtl="0" eaLnBrk="1" latinLnBrk="0" hangingPunct="1">
-              <a:lnSpc>
-                <a:spcPct val="90000"/>
-              </a:lnSpc>
-              <a:spcBef>
-                <a:spcPts val="500"/>
-              </a:spcBef>
-              <a:buFont typeface="Arial" panose="020B0604020202020204" pitchFamily="34" charset="0"/>
-              <a:buChar char="•"/>
-              <a:defRPr sz="1800" kern="1200">
-                <a:solidFill>
-                  <a:schemeClr val="tx1"/>
-                </a:solidFill>
-                <a:latin typeface="+mn-lt"/>
-                <a:ea typeface="+mn-ea"/>
-                <a:cs typeface="+mn-cs"/>
-              </a:defRPr>
-            </a:lvl7pPr>
-            <a:lvl8pPr marL="3429000" indent="-228600" algn="l" defTabSz="914400" rtl="0" eaLnBrk="1" latinLnBrk="0" hangingPunct="1">
-              <a:lnSpc>
-                <a:spcPct val="90000"/>
-              </a:lnSpc>
-              <a:spcBef>
-                <a:spcPts val="500"/>
-              </a:spcBef>
-              <a:buFont typeface="Arial" panose="020B0604020202020204" pitchFamily="34" charset="0"/>
-              <a:buChar char="•"/>
-              <a:defRPr sz="1800" kern="1200">
-                <a:solidFill>
-                  <a:schemeClr val="tx1"/>
-                </a:solidFill>
-                <a:latin typeface="+mn-lt"/>
-                <a:ea typeface="+mn-ea"/>
-                <a:cs typeface="+mn-cs"/>
-              </a:defRPr>
-            </a:lvl8pPr>
-            <a:lvl9pPr marL="3886200" indent="-228600" algn="l" defTabSz="914400" rtl="0" eaLnBrk="1" latinLnBrk="0" hangingPunct="1">
-              <a:lnSpc>
-                <a:spcPct val="90000"/>
-              </a:lnSpc>
-              <a:spcBef>
-                <a:spcPts val="500"/>
-              </a:spcBef>
-              <a:buFont typeface="Arial" panose="020B0604020202020204" pitchFamily="34" charset="0"/>
-              <a:buChar char="•"/>
-              <a:defRPr sz="1800" kern="1200">
-                <a:solidFill>
-                  <a:schemeClr val="tx1"/>
-                </a:solidFill>
-                <a:latin typeface="+mn-lt"/>
-                <a:ea typeface="+mn-ea"/>
-                <a:cs typeface="+mn-cs"/>
-              </a:defRPr>
-            </a:lvl9pPr>
-          </a:lstStyle>
-          <a:p>
-            <a:r>
-              <a:rPr lang="en-CA" dirty="0"/>
-              <a:t>Create the </a:t>
-            </a:r>
-            <a:r>
-              <a:rPr lang="en-CA" b="1" dirty="0">
-                <a:solidFill>
-                  <a:schemeClr val="accent4"/>
-                </a:solidFill>
-              </a:rPr>
-              <a:t>solve</a:t>
-            </a:r>
-            <a:r>
-              <a:rPr lang="en-CA" dirty="0"/>
-              <a:t> action</a:t>
-            </a:r>
-          </a:p>
-          <a:p>
-            <a:pPr lvl="1"/>
-            <a:r>
-              <a:rPr lang="en-CA" dirty="0"/>
-              <a:t>Must know the assignment</a:t>
-            </a:r>
-          </a:p>
-          <a:p>
-            <a:pPr lvl="1"/>
-            <a:r>
-              <a:rPr lang="en-CA" dirty="0"/>
-              <a:t>Sets the </a:t>
-            </a:r>
-            <a:r>
-              <a:rPr lang="en-CA" b="1" dirty="0">
-                <a:solidFill>
-                  <a:schemeClr val="accent2"/>
-                </a:solidFill>
-              </a:rPr>
-              <a:t>solved</a:t>
-            </a:r>
-            <a:r>
-              <a:rPr lang="en-CA" b="1" dirty="0"/>
-              <a:t> </a:t>
-            </a:r>
-            <a:r>
-              <a:rPr lang="en-CA" dirty="0"/>
-              <a:t>predicate</a:t>
-            </a:r>
-            <a:br>
-              <a:rPr lang="en-CA" dirty="0"/>
-            </a:br>
-            <a:endParaRPr lang="en-CA" dirty="0"/>
-          </a:p>
-        </p:txBody>
-      </p:sp>
-      <p:sp>
-        <p:nvSpPr>
-          <p:cNvPr id="3" name="Content Placeholder 4">
-            <a:extLst>
-              <a:ext uri="{FF2B5EF4-FFF2-40B4-BE49-F238E27FC236}">
-                <a16:creationId xmlns:a16="http://schemas.microsoft.com/office/drawing/2014/main" id="{4E4F9B71-CB5B-C75F-C1DA-19F8846C640C}"/>
-              </a:ext>
-            </a:extLst>
-          </p:cNvPr>
-          <p:cNvSpPr txBox="1">
-            <a:spLocks/>
-          </p:cNvSpPr>
-          <p:nvPr/>
-        </p:nvSpPr>
-        <p:spPr>
-          <a:xfrm>
-            <a:off x="1424544" y="3251016"/>
-            <a:ext cx="5421580" cy="1843499"/>
-          </a:xfrm>
-          <a:prstGeom prst="rect">
-            <a:avLst/>
-          </a:prstGeom>
-        </p:spPr>
-        <p:txBody>
-          <a:bodyPr vert="horz" lIns="91440" tIns="45720" rIns="91440" bIns="45720" rtlCol="0">
-            <a:normAutofit/>
-          </a:bodyPr>
-          <a:lstStyle>
-            <a:lvl1pPr marL="228600" indent="-228600" algn="l" defTabSz="914400" rtl="0" eaLnBrk="1" latinLnBrk="0" hangingPunct="1">
-              <a:lnSpc>
-                <a:spcPct val="90000"/>
-              </a:lnSpc>
-              <a:spcBef>
-                <a:spcPts val="1000"/>
-              </a:spcBef>
-              <a:buFont typeface="Arial" panose="020B0604020202020204" pitchFamily="34" charset="0"/>
-              <a:buChar char="•"/>
-              <a:defRPr sz="2800" kern="1200">
-                <a:solidFill>
-                  <a:schemeClr val="tx1"/>
-                </a:solidFill>
-                <a:latin typeface="+mn-lt"/>
-                <a:ea typeface="+mn-ea"/>
-                <a:cs typeface="+mn-cs"/>
-              </a:defRPr>
-            </a:lvl1pPr>
-            <a:lvl2pPr marL="685800" indent="-228600" algn="l" defTabSz="914400" rtl="0" eaLnBrk="1" latinLnBrk="0" hangingPunct="1">
-              <a:lnSpc>
-                <a:spcPct val="90000"/>
-              </a:lnSpc>
-              <a:spcBef>
-                <a:spcPts val="500"/>
-              </a:spcBef>
-              <a:buFont typeface="Arial" panose="020B0604020202020204" pitchFamily="34" charset="0"/>
-              <a:buChar char="•"/>
-              <a:defRPr sz="2400" kern="1200">
-                <a:solidFill>
-                  <a:schemeClr val="tx1"/>
-                </a:solidFill>
-                <a:latin typeface="+mn-lt"/>
-                <a:ea typeface="+mn-ea"/>
-                <a:cs typeface="+mn-cs"/>
-              </a:defRPr>
-            </a:lvl2pPr>
-            <a:lvl3pPr marL="1143000" indent="-228600" algn="l" defTabSz="914400" rtl="0" eaLnBrk="1" latinLnBrk="0" hangingPunct="1">
-              <a:lnSpc>
-                <a:spcPct val="90000"/>
-              </a:lnSpc>
-              <a:spcBef>
-                <a:spcPts val="500"/>
-              </a:spcBef>
-              <a:buFont typeface="Arial" panose="020B0604020202020204" pitchFamily="34" charset="0"/>
-              <a:buChar char="•"/>
-              <a:defRPr sz="2000" kern="1200">
-                <a:solidFill>
-                  <a:schemeClr val="tx1"/>
-                </a:solidFill>
-                <a:latin typeface="+mn-lt"/>
-                <a:ea typeface="+mn-ea"/>
-                <a:cs typeface="+mn-cs"/>
-              </a:defRPr>
-            </a:lvl3pPr>
-            <a:lvl4pPr marL="1600200" indent="-228600" algn="l" defTabSz="914400" rtl="0" eaLnBrk="1" latinLnBrk="0" hangingPunct="1">
-              <a:lnSpc>
-                <a:spcPct val="90000"/>
-              </a:lnSpc>
-              <a:spcBef>
-                <a:spcPts val="500"/>
-              </a:spcBef>
-              <a:buFont typeface="Arial" panose="020B0604020202020204" pitchFamily="34" charset="0"/>
-              <a:buChar char="•"/>
-              <a:defRPr sz="1800" kern="1200">
-                <a:solidFill>
-                  <a:schemeClr val="tx1"/>
-                </a:solidFill>
-                <a:latin typeface="+mn-lt"/>
-                <a:ea typeface="+mn-ea"/>
-                <a:cs typeface="+mn-cs"/>
-              </a:defRPr>
-            </a:lvl4pPr>
-            <a:lvl5pPr marL="2057400" indent="-228600" algn="l" defTabSz="914400" rtl="0" eaLnBrk="1" latinLnBrk="0" hangingPunct="1">
-              <a:lnSpc>
-                <a:spcPct val="90000"/>
-              </a:lnSpc>
-              <a:spcBef>
-                <a:spcPts val="500"/>
-              </a:spcBef>
-              <a:buFont typeface="Arial" panose="020B0604020202020204" pitchFamily="34" charset="0"/>
-              <a:buChar char="•"/>
-              <a:defRPr sz="1800" kern="1200">
-                <a:solidFill>
-                  <a:schemeClr val="tx1"/>
-                </a:solidFill>
-                <a:latin typeface="+mn-lt"/>
-                <a:ea typeface="+mn-ea"/>
-                <a:cs typeface="+mn-cs"/>
-              </a:defRPr>
-            </a:lvl5pPr>
-            <a:lvl6pPr marL="2514600" indent="-228600" algn="l" defTabSz="914400" rtl="0" eaLnBrk="1" latinLnBrk="0" hangingPunct="1">
-              <a:lnSpc>
-                <a:spcPct val="90000"/>
-              </a:lnSpc>
-              <a:spcBef>
-                <a:spcPts val="500"/>
-              </a:spcBef>
-              <a:buFont typeface="Arial" panose="020B0604020202020204" pitchFamily="34" charset="0"/>
-              <a:buChar char="•"/>
-              <a:defRPr sz="1800" kern="1200">
-                <a:solidFill>
-                  <a:schemeClr val="tx1"/>
-                </a:solidFill>
-                <a:latin typeface="+mn-lt"/>
-                <a:ea typeface="+mn-ea"/>
-                <a:cs typeface="+mn-cs"/>
-              </a:defRPr>
-            </a:lvl6pPr>
-            <a:lvl7pPr marL="2971800" indent="-228600" algn="l" defTabSz="914400" rtl="0" eaLnBrk="1" latinLnBrk="0" hangingPunct="1">
-              <a:lnSpc>
-                <a:spcPct val="90000"/>
-              </a:lnSpc>
-              <a:spcBef>
-                <a:spcPts val="500"/>
-              </a:spcBef>
-              <a:buFont typeface="Arial" panose="020B0604020202020204" pitchFamily="34" charset="0"/>
-              <a:buChar char="•"/>
-              <a:defRPr sz="1800" kern="1200">
-                <a:solidFill>
-                  <a:schemeClr val="tx1"/>
-                </a:solidFill>
-                <a:latin typeface="+mn-lt"/>
-                <a:ea typeface="+mn-ea"/>
-                <a:cs typeface="+mn-cs"/>
-              </a:defRPr>
-            </a:lvl7pPr>
-            <a:lvl8pPr marL="3429000" indent="-228600" algn="l" defTabSz="914400" rtl="0" eaLnBrk="1" latinLnBrk="0" hangingPunct="1">
-              <a:lnSpc>
-                <a:spcPct val="90000"/>
-              </a:lnSpc>
-              <a:spcBef>
-                <a:spcPts val="500"/>
-              </a:spcBef>
-              <a:buFont typeface="Arial" panose="020B0604020202020204" pitchFamily="34" charset="0"/>
-              <a:buChar char="•"/>
-              <a:defRPr sz="1800" kern="1200">
-                <a:solidFill>
-                  <a:schemeClr val="tx1"/>
-                </a:solidFill>
-                <a:latin typeface="+mn-lt"/>
-                <a:ea typeface="+mn-ea"/>
-                <a:cs typeface="+mn-cs"/>
-              </a:defRPr>
-            </a:lvl8pPr>
-            <a:lvl9pPr marL="3886200" indent="-228600" algn="l" defTabSz="914400" rtl="0" eaLnBrk="1" latinLnBrk="0" hangingPunct="1">
-              <a:lnSpc>
-                <a:spcPct val="90000"/>
-              </a:lnSpc>
-              <a:spcBef>
-                <a:spcPts val="500"/>
-              </a:spcBef>
-              <a:buFont typeface="Arial" panose="020B0604020202020204" pitchFamily="34" charset="0"/>
-              <a:buChar char="•"/>
-              <a:defRPr sz="1800" kern="1200">
-                <a:solidFill>
-                  <a:schemeClr val="tx1"/>
-                </a:solidFill>
-                <a:latin typeface="+mn-lt"/>
-                <a:ea typeface="+mn-ea"/>
-                <a:cs typeface="+mn-cs"/>
-              </a:defRPr>
-            </a:lvl9pPr>
-          </a:lstStyle>
-          <a:p>
-            <a:r>
-              <a:rPr lang="en-CA" dirty="0"/>
-              <a:t>Create the </a:t>
-            </a:r>
-            <a:r>
-              <a:rPr lang="en-CA" b="1" dirty="0">
-                <a:solidFill>
-                  <a:schemeClr val="accent4"/>
-                </a:solidFill>
-              </a:rPr>
-              <a:t>check</a:t>
-            </a:r>
-            <a:r>
-              <a:rPr lang="en-CA" dirty="0"/>
-              <a:t> sensing action</a:t>
-            </a:r>
-          </a:p>
-          <a:p>
-            <a:pPr lvl="1"/>
-            <a:r>
-              <a:rPr lang="en-CA" dirty="0"/>
-              <a:t>No precondition (just leave it out)</a:t>
-            </a:r>
-          </a:p>
-          <a:p>
-            <a:pPr lvl="1"/>
-            <a:r>
-              <a:rPr lang="en-CA" dirty="0"/>
-              <a:t>Checks a location for a number</a:t>
-            </a:r>
-          </a:p>
-          <a:p>
-            <a:pPr lvl="1"/>
-            <a:r>
-              <a:rPr lang="en-CA" dirty="0"/>
-              <a:t>Senses the </a:t>
-            </a:r>
-            <a:r>
-              <a:rPr lang="en-CA" b="1" dirty="0">
-                <a:solidFill>
-                  <a:schemeClr val="accent2"/>
-                </a:solidFill>
-              </a:rPr>
-              <a:t>assigned</a:t>
-            </a:r>
-            <a:r>
-              <a:rPr lang="en-CA" dirty="0"/>
-              <a:t> predicate</a:t>
-            </a:r>
-          </a:p>
-        </p:txBody>
-      </p:sp>
-    </p:spTree>
-    <p:extLst>
-      <p:ext uri="{BB962C8B-B14F-4D97-AF65-F5344CB8AC3E}">
-        <p14:creationId xmlns:p14="http://schemas.microsoft.com/office/powerpoint/2010/main" val="1315833981"/>
-      </p:ext>
-    </p:extLst>
-  </p:cSld>
-  <p:clrMapOvr>
-    <a:masterClrMapping/>
-  </p:clrMapOvr>
 </p:sld>
 </file>
 
@@ -12786,29 +12389,30 @@
             <p:ph idx="1"/>
           </p:nvPr>
         </p:nvSpPr>
-        <p:spPr/>
+        <p:spPr>
+          <a:xfrm>
+            <a:off x="838200" y="2524587"/>
+            <a:ext cx="10515600" cy="1808826"/>
+          </a:xfrm>
+        </p:spPr>
         <p:txBody>
-          <a:bodyPr/>
+          <a:bodyPr>
+            <a:normAutofit/>
+          </a:bodyPr>
           <a:lstStyle/>
           <a:p>
             <a:pPr marL="0" indent="0">
               <a:buNone/>
             </a:pPr>
-            <a:endParaRPr lang="en-CA" dirty="0"/>
-          </a:p>
-          <a:p>
-            <a:endParaRPr lang="en-CA" dirty="0"/>
-          </a:p>
-          <a:p>
-            <a:endParaRPr lang="en-CA" dirty="0"/>
+            <a:endParaRPr lang="en-CA" sz="4000" dirty="0"/>
           </a:p>
           <a:p>
             <a:pPr marL="0" indent="0" algn="ctr">
               <a:buNone/>
             </a:pPr>
             <a:r>
-              <a:rPr lang="en-CA" sz="2800" dirty="0"/>
-              <a:t>http://editor.planning.domains/planning-course/ppos/minified</a:t>
+              <a:rPr lang="en-CA" sz="4000" dirty="0"/>
+              <a:t>https://mulab.ai/cisc-813/makemusic</a:t>
             </a:r>
           </a:p>
         </p:txBody>
@@ -12816,7 +12420,7 @@
     </p:spTree>
     <p:extLst>
       <p:ext uri="{BB962C8B-B14F-4D97-AF65-F5344CB8AC3E}">
-        <p14:creationId xmlns:p14="http://schemas.microsoft.com/office/powerpoint/2010/main" val="4031490244"/>
+        <p14:creationId xmlns:p14="http://schemas.microsoft.com/office/powerpoint/2010/main" val="3188167424"/>
       </p:ext>
     </p:extLst>
   </p:cSld>

</xml_diff>

<commit_message>
Fixed url for temporal slides.
</commit_message>
<xml_diff>
--- a/exercises/cisc-813/temporal/slides.pptx
+++ b/exercises/cisc-813/temporal/slides.pptx
@@ -10458,8 +10458,17 @@
             </a:pPr>
             <a:r>
               <a:rPr lang="en-CA" sz="2800" dirty="0"/>
-              <a:t>http://editor.planning.domains/planning-course/temporal/itsahit</a:t>
-            </a:r>
+              <a:t>http://editor.planning.domains/planning-course/</a:t>
+            </a:r>
+            <a:r>
+              <a:rPr lang="en-CA" sz="2800"/>
+              <a:t>temporal/</a:t>
+            </a:r>
+            <a:r>
+              <a:rPr lang="en-CA"/>
+              <a:t>mozart</a:t>
+            </a:r>
+            <a:endParaRPr lang="en-CA" sz="2800" dirty="0"/>
           </a:p>
         </p:txBody>
       </p:sp>
@@ -10746,28 +10755,35 @@
         </p:blipFill>
         <p:spPr>
           <a:xfrm>
-            <a:off x="1562582" y="2154730"/>
-            <a:ext cx="11647070" cy="2548540"/>
+            <a:off x="0" y="2114294"/>
+            <a:ext cx="11373465" cy="2488671"/>
           </a:xfrm>
-          <a:prstGeom prst="rect">
-            <a:avLst/>
+          <a:prstGeom prst="roundRect">
+            <a:avLst>
+              <a:gd name="adj" fmla="val 16667"/>
+            </a:avLst>
           </a:prstGeom>
           <a:ln>
             <a:noFill/>
           </a:ln>
           <a:effectLst>
-            <a:reflection blurRad="12700" stA="30000" endPos="30000" dist="5000" dir="5400000" sy="-100000" algn="bl" rotWithShape="0"/>
+            <a:outerShdw blurRad="152400" dist="12000" dir="900000" sy="98000" kx="110000" ky="200000" algn="tl" rotWithShape="0">
+              <a:srgbClr val="000000">
+                <a:alpha val="30000"/>
+              </a:srgbClr>
+            </a:outerShdw>
           </a:effectLst>
           <a:scene3d>
-            <a:camera prst="perspectiveContrastingLeftFacing">
-              <a:rot lat="300000" lon="19800000" rev="0"/>
+            <a:camera prst="perspectiveRelaxed">
+              <a:rot lat="19800000" lon="1200000" rev="20820000"/>
             </a:camera>
-            <a:lightRig rig="threePt" dir="t">
-              <a:rot lat="0" lon="0" rev="2700000"/>
-            </a:lightRig>
+            <a:lightRig rig="threePt" dir="t"/>
           </a:scene3d>
-          <a:sp3d>
-            <a:bevelT w="63500" h="50800"/>
+          <a:sp3d contourW="6350" prstMaterial="matte">
+            <a:bevelT w="101600" h="101600"/>
+            <a:contourClr>
+              <a:srgbClr val="969696"/>
+            </a:contourClr>
           </a:sp3d>
         </p:spPr>
       </p:pic>

</xml_diff>

<commit_message>
Touching up temporal slides.
</commit_message>
<xml_diff>
--- a/exercises/cisc-813/temporal/slides.pptx
+++ b/exercises/cisc-813/temporal/slides.pptx
@@ -698,7 +698,7 @@
           <a:p>
             <a:fld id="{D6D0F569-AC90-44EB-9EF4-4E5C2F5D823C}" type="datetime1">
               <a:rPr lang="en-US" smtClean="0"/>
-              <a:t>2/25/2023</a:t>
+              <a:t>3/8/2023</a:t>
             </a:fld>
             <a:endParaRPr lang="en-US" dirty="0"/>
           </a:p>
@@ -1377,7 +1377,7 @@
           <a:p>
             <a:fld id="{46BA7D41-E8B7-4A0B-B861-3EC4AE88917D}" type="datetime1">
               <a:rPr lang="en-US" smtClean="0"/>
-              <a:t>2/25/2023</a:t>
+              <a:t>3/8/2023</a:t>
             </a:fld>
             <a:endParaRPr lang="en-US" dirty="0"/>
           </a:p>
@@ -2066,7 +2066,7 @@
           <a:p>
             <a:fld id="{A7C34823-0B19-4B4E-A643-7A3B0A3D24D6}" type="datetime1">
               <a:rPr lang="en-US" smtClean="0"/>
-              <a:t>2/25/2023</a:t>
+              <a:t>3/8/2023</a:t>
             </a:fld>
             <a:endParaRPr lang="en-US" dirty="0"/>
           </a:p>
@@ -3189,7 +3189,7 @@
           <a:p>
             <a:fld id="{8C2D79EF-17C8-45D8-9866-DAF5723FC604}" type="datetime1">
               <a:rPr lang="en-US" smtClean="0"/>
-              <a:t>2/25/2023</a:t>
+              <a:t>3/8/2023</a:t>
             </a:fld>
             <a:endParaRPr lang="en-US" dirty="0"/>
           </a:p>
@@ -3944,7 +3944,7 @@
           <a:p>
             <a:fld id="{DFFC2ADC-3680-4013-A757-E4663495DB98}" type="datetime1">
               <a:rPr lang="en-US" smtClean="0"/>
-              <a:t>2/25/2023</a:t>
+              <a:t>3/8/2023</a:t>
             </a:fld>
             <a:endParaRPr lang="en-US" dirty="0"/>
           </a:p>
@@ -4691,7 +4691,7 @@
           <a:p>
             <a:fld id="{4751BA94-5DCA-4F19-960F-0FB2BD5EE85A}" type="datetime1">
               <a:rPr lang="en-US" smtClean="0"/>
-              <a:t>2/25/2023</a:t>
+              <a:t>3/8/2023</a:t>
             </a:fld>
             <a:endParaRPr lang="en-US" dirty="0"/>
           </a:p>
@@ -5585,7 +5585,7 @@
           <a:p>
             <a:fld id="{01BED947-38D9-44AC-8B89-E79758333B77}" type="datetime1">
               <a:rPr lang="en-US" smtClean="0"/>
-              <a:t>2/25/2023</a:t>
+              <a:t>3/8/2023</a:t>
             </a:fld>
             <a:endParaRPr lang="en-US" dirty="0"/>
           </a:p>
@@ -6206,7 +6206,7 @@
           <a:p>
             <a:fld id="{3781E23F-BD3C-4F23-B116-2B758120C8AC}" type="datetime1">
               <a:rPr lang="en-US" smtClean="0"/>
-              <a:t>2/25/2023</a:t>
+              <a:t>3/8/2023</a:t>
             </a:fld>
             <a:endParaRPr lang="en-US" dirty="0"/>
           </a:p>
@@ -6798,7 +6798,7 @@
           <a:p>
             <a:fld id="{473CFAA9-6D59-4D98-869E-ACBDB83B2CA4}" type="datetime1">
               <a:rPr lang="en-US" smtClean="0"/>
-              <a:t>2/25/2023</a:t>
+              <a:t>3/8/2023</a:t>
             </a:fld>
             <a:endParaRPr lang="en-US"/>
           </a:p>
@@ -7590,7 +7590,7 @@
           <a:p>
             <a:fld id="{DC410804-27E3-430A-BB42-B831260DE39A}" type="datetime1">
               <a:rPr lang="en-US" smtClean="0"/>
-              <a:t>2/25/2023</a:t>
+              <a:t>3/8/2023</a:t>
             </a:fld>
             <a:endParaRPr lang="en-US" dirty="0"/>
           </a:p>
@@ -8361,7 +8361,7 @@
           <a:p>
             <a:fld id="{60E22DE3-3D1A-4D53-B9A6-6C7463B8C992}" type="datetime1">
               <a:rPr lang="en-US" smtClean="0"/>
-              <a:t>2/25/2023</a:t>
+              <a:t>3/8/2023</a:t>
             </a:fld>
             <a:endParaRPr lang="en-US" dirty="0"/>
           </a:p>
@@ -8672,7 +8672,7 @@
             <a:fld id="{5ECD8B30-1B71-45A1-8314-D59C86F581E1}" type="datetime1">
               <a:rPr lang="en-US" smtClean="0"/>
               <a:pPr/>
-              <a:t>2/25/2023</a:t>
+              <a:t>3/8/2023</a:t>
             </a:fld>
             <a:endParaRPr lang="en-US" b="1" dirty="0"/>
           </a:p>
@@ -10797,6 +10797,158 @@
   <p:clrMapOvr>
     <a:masterClrMapping/>
   </p:clrMapOvr>
+  <p:timing>
+    <p:tnLst>
+      <p:par>
+        <p:cTn id="1" dur="indefinite" restart="never" nodeType="tmRoot">
+          <p:childTnLst>
+            <p:seq concurrent="1" nextAc="seek">
+              <p:cTn id="2" dur="indefinite" nodeType="mainSeq">
+                <p:childTnLst>
+                  <p:par>
+                    <p:cTn id="3" fill="hold">
+                      <p:stCondLst>
+                        <p:cond delay="indefinite"/>
+                      </p:stCondLst>
+                      <p:childTnLst>
+                        <p:par>
+                          <p:cTn id="4" fill="hold">
+                            <p:stCondLst>
+                              <p:cond delay="0"/>
+                            </p:stCondLst>
+                            <p:childTnLst>
+                              <p:par>
+                                <p:cTn id="5" presetID="31" presetClass="entr" presetSubtype="0" fill="hold" nodeType="clickEffect">
+                                  <p:stCondLst>
+                                    <p:cond delay="0"/>
+                                  </p:stCondLst>
+                                  <p:childTnLst>
+                                    <p:set>
+                                      <p:cBhvr>
+                                        <p:cTn id="6" dur="1" fill="hold">
+                                          <p:stCondLst>
+                                            <p:cond delay="0"/>
+                                          </p:stCondLst>
+                                        </p:cTn>
+                                        <p:tgtEl>
+                                          <p:spTgt spid="5"/>
+                                        </p:tgtEl>
+                                        <p:attrNameLst>
+                                          <p:attrName>style.visibility</p:attrName>
+                                        </p:attrNameLst>
+                                      </p:cBhvr>
+                                      <p:to>
+                                        <p:strVal val="visible"/>
+                                      </p:to>
+                                    </p:set>
+                                    <p:anim calcmode="lin" valueType="num">
+                                      <p:cBhvr>
+                                        <p:cTn id="7" dur="1000" fill="hold"/>
+                                        <p:tgtEl>
+                                          <p:spTgt spid="5"/>
+                                        </p:tgtEl>
+                                        <p:attrNameLst>
+                                          <p:attrName>ppt_w</p:attrName>
+                                        </p:attrNameLst>
+                                      </p:cBhvr>
+                                      <p:tavLst>
+                                        <p:tav tm="0">
+                                          <p:val>
+                                            <p:fltVal val="0"/>
+                                          </p:val>
+                                        </p:tav>
+                                        <p:tav tm="100000">
+                                          <p:val>
+                                            <p:strVal val="#ppt_w"/>
+                                          </p:val>
+                                        </p:tav>
+                                      </p:tavLst>
+                                    </p:anim>
+                                    <p:anim calcmode="lin" valueType="num">
+                                      <p:cBhvr>
+                                        <p:cTn id="8" dur="1000" fill="hold"/>
+                                        <p:tgtEl>
+                                          <p:spTgt spid="5"/>
+                                        </p:tgtEl>
+                                        <p:attrNameLst>
+                                          <p:attrName>ppt_h</p:attrName>
+                                        </p:attrNameLst>
+                                      </p:cBhvr>
+                                      <p:tavLst>
+                                        <p:tav tm="0">
+                                          <p:val>
+                                            <p:fltVal val="0"/>
+                                          </p:val>
+                                        </p:tav>
+                                        <p:tav tm="100000">
+                                          <p:val>
+                                            <p:strVal val="#ppt_h"/>
+                                          </p:val>
+                                        </p:tav>
+                                      </p:tavLst>
+                                    </p:anim>
+                                    <p:anim calcmode="lin" valueType="num">
+                                      <p:cBhvr>
+                                        <p:cTn id="9" dur="1000" fill="hold"/>
+                                        <p:tgtEl>
+                                          <p:spTgt spid="5"/>
+                                        </p:tgtEl>
+                                        <p:attrNameLst>
+                                          <p:attrName>style.rotation</p:attrName>
+                                        </p:attrNameLst>
+                                      </p:cBhvr>
+                                      <p:tavLst>
+                                        <p:tav tm="0">
+                                          <p:val>
+                                            <p:fltVal val="90"/>
+                                          </p:val>
+                                        </p:tav>
+                                        <p:tav tm="100000">
+                                          <p:val>
+                                            <p:fltVal val="0"/>
+                                          </p:val>
+                                        </p:tav>
+                                      </p:tavLst>
+                                    </p:anim>
+                                    <p:animEffect transition="in" filter="fade">
+                                      <p:cBhvr>
+                                        <p:cTn id="10" dur="1000"/>
+                                        <p:tgtEl>
+                                          <p:spTgt spid="5"/>
+                                        </p:tgtEl>
+                                      </p:cBhvr>
+                                    </p:animEffect>
+                                  </p:childTnLst>
+                                </p:cTn>
+                              </p:par>
+                            </p:childTnLst>
+                          </p:cTn>
+                        </p:par>
+                      </p:childTnLst>
+                    </p:cTn>
+                  </p:par>
+                </p:childTnLst>
+              </p:cTn>
+              <p:prevCondLst>
+                <p:cond evt="onPrev" delay="0">
+                  <p:tgtEl>
+                    <p:sldTgt/>
+                  </p:tgtEl>
+                </p:cond>
+              </p:prevCondLst>
+              <p:nextCondLst>
+                <p:cond evt="onNext" delay="0">
+                  <p:tgtEl>
+                    <p:sldTgt/>
+                  </p:tgtEl>
+                </p:cond>
+              </p:nextCondLst>
+            </p:seq>
+          </p:childTnLst>
+        </p:cTn>
+      </p:par>
+    </p:tnLst>
+  </p:timing>
 </p:sld>
 </file>
 

</xml_diff>